<commit_message>
Commit prior to presentation and last minute hackeration
</commit_message>
<xml_diff>
--- a/QGISUG_SW_March_2019/SW User Group Population Presentation.pptx
+++ b/QGISUG_SW_March_2019/SW User Group Population Presentation.pptx
@@ -2,10 +2,10 @@
 <file path=ppt/presentation.xml><?xml version="1.0" encoding="utf-8"?>
 <p:presentation xmlns:a="http://schemas.openxmlformats.org/drawingml/2006/main" xmlns:r="http://schemas.openxmlformats.org/officeDocument/2006/relationships" xmlns:p="http://schemas.openxmlformats.org/presentationml/2006/main" saveSubsetFonts="1" autoCompressPictures="0">
   <p:sldMasterIdLst>
-    <p:sldMasterId id="2147483648" r:id="rId1"/>
+    <p:sldMasterId id="2147483660" r:id="rId1"/>
   </p:sldMasterIdLst>
   <p:notesMasterIdLst>
-    <p:notesMasterId r:id="rId11"/>
+    <p:notesMasterId r:id="rId12"/>
   </p:notesMasterIdLst>
   <p:sldIdLst>
     <p:sldId id="266" r:id="rId2"/>
@@ -17,6 +17,7 @@
     <p:sldId id="272" r:id="rId8"/>
     <p:sldId id="273" r:id="rId9"/>
     <p:sldId id="274" r:id="rId10"/>
+    <p:sldId id="275" r:id="rId11"/>
   </p:sldIdLst>
   <p:sldSz cx="12192000" cy="6858000"/>
   <p:notesSz cx="6858000" cy="9144000"/>
@@ -575,13 +576,7 @@
       </p:grpSpPr>
       <p:sp>
         <p:nvSpPr>
-          <p:cNvPr id="2" name="Title 1">
-            <a:extLst>
-              <a:ext uri="{FF2B5EF4-FFF2-40B4-BE49-F238E27FC236}">
-                <a16:creationId xmlns:a16="http://schemas.microsoft.com/office/drawing/2014/main" id="{BF65FBEA-A730-F640-A310-D01E054BDF8B}"/>
-              </a:ext>
-            </a:extLst>
-          </p:cNvPr>
+          <p:cNvPr id="2" name="Title 1"/>
           <p:cNvSpPr>
             <a:spLocks noGrp="1"/>
           </p:cNvSpPr>
@@ -604,21 +599,16 @@
           </a:lstStyle>
           <a:p>
             <a:r>
-              <a:rPr lang="en-US"/>
+              <a:rPr lang="en-US" smtClean="0"/>
               <a:t>Click to edit Master title style</a:t>
             </a:r>
-          </a:p>
-        </p:txBody>
-      </p:sp>
-      <p:sp>
-        <p:nvSpPr>
-          <p:cNvPr id="3" name="Subtitle 2">
-            <a:extLst>
-              <a:ext uri="{FF2B5EF4-FFF2-40B4-BE49-F238E27FC236}">
-                <a16:creationId xmlns:a16="http://schemas.microsoft.com/office/drawing/2014/main" id="{123DA81F-371C-E447-B22D-51D5AA701E3F}"/>
-              </a:ext>
-            </a:extLst>
-          </p:cNvPr>
+            <a:endParaRPr lang="en-US" dirty="0"/>
+          </a:p>
+        </p:txBody>
+      </p:sp>
+      <p:sp>
+        <p:nvSpPr>
+          <p:cNvPr id="3" name="Subtitle 2"/>
           <p:cNvSpPr>
             <a:spLocks noGrp="1"/>
           </p:cNvSpPr>
@@ -674,21 +664,16 @@
           </a:lstStyle>
           <a:p>
             <a:r>
-              <a:rPr lang="en-US"/>
+              <a:rPr lang="en-US" smtClean="0"/>
               <a:t>Click to edit Master subtitle style</a:t>
             </a:r>
-          </a:p>
-        </p:txBody>
-      </p:sp>
-      <p:sp>
-        <p:nvSpPr>
-          <p:cNvPr id="4" name="Date Placeholder 3">
-            <a:extLst>
-              <a:ext uri="{FF2B5EF4-FFF2-40B4-BE49-F238E27FC236}">
-                <a16:creationId xmlns:a16="http://schemas.microsoft.com/office/drawing/2014/main" id="{3819C5E5-0B2F-AC45-93F6-2C267C31E78D}"/>
-              </a:ext>
-            </a:extLst>
-          </p:cNvPr>
+            <a:endParaRPr lang="en-US" dirty="0"/>
+          </a:p>
+        </p:txBody>
+      </p:sp>
+      <p:sp>
+        <p:nvSpPr>
+          <p:cNvPr id="4" name="Date Placeholder 3"/>
           <p:cNvSpPr>
             <a:spLocks noGrp="1"/>
           </p:cNvSpPr>
@@ -711,13 +696,7 @@
       </p:sp>
       <p:sp>
         <p:nvSpPr>
-          <p:cNvPr id="5" name="Footer Placeholder 4">
-            <a:extLst>
-              <a:ext uri="{FF2B5EF4-FFF2-40B4-BE49-F238E27FC236}">
-                <a16:creationId xmlns:a16="http://schemas.microsoft.com/office/drawing/2014/main" id="{BA8A43DE-241F-D041-82D3-847EDF6A5B30}"/>
-              </a:ext>
-            </a:extLst>
-          </p:cNvPr>
+          <p:cNvPr id="5" name="Footer Placeholder 4"/>
           <p:cNvSpPr>
             <a:spLocks noGrp="1"/>
           </p:cNvSpPr>
@@ -736,13 +715,7 @@
       </p:sp>
       <p:sp>
         <p:nvSpPr>
-          <p:cNvPr id="6" name="Slide Number Placeholder 5">
-            <a:extLst>
-              <a:ext uri="{FF2B5EF4-FFF2-40B4-BE49-F238E27FC236}">
-                <a16:creationId xmlns:a16="http://schemas.microsoft.com/office/drawing/2014/main" id="{DC50E75E-6570-D344-8BE9-9B29642D487B}"/>
-              </a:ext>
-            </a:extLst>
-          </p:cNvPr>
+          <p:cNvPr id="6" name="Slide Number Placeholder 5"/>
           <p:cNvSpPr>
             <a:spLocks noGrp="1"/>
           </p:cNvSpPr>
@@ -766,7 +739,7 @@
     </p:spTree>
     <p:extLst>
       <p:ext uri="{BB962C8B-B14F-4D97-AF65-F5344CB8AC3E}">
-        <p14:creationId xmlns:p14="http://schemas.microsoft.com/office/powerpoint/2010/main" val="1612900370"/>
+        <p14:creationId xmlns:p14="http://schemas.microsoft.com/office/powerpoint/2010/main" val="467980055"/>
       </p:ext>
     </p:extLst>
   </p:cSld>
@@ -795,13 +768,7 @@
       </p:grpSpPr>
       <p:sp>
         <p:nvSpPr>
-          <p:cNvPr id="2" name="Title 1">
-            <a:extLst>
-              <a:ext uri="{FF2B5EF4-FFF2-40B4-BE49-F238E27FC236}">
-                <a16:creationId xmlns:a16="http://schemas.microsoft.com/office/drawing/2014/main" id="{C3E7BF70-6EC8-8F4B-A13F-DB57D10EA6EC}"/>
-              </a:ext>
-            </a:extLst>
-          </p:cNvPr>
+          <p:cNvPr id="2" name="Title 1"/>
           <p:cNvSpPr>
             <a:spLocks noGrp="1"/>
           </p:cNvSpPr>
@@ -815,21 +782,16 @@
           <a:lstStyle/>
           <a:p>
             <a:r>
-              <a:rPr lang="en-US"/>
+              <a:rPr lang="en-US" smtClean="0"/>
               <a:t>Click to edit Master title style</a:t>
             </a:r>
-          </a:p>
-        </p:txBody>
-      </p:sp>
-      <p:sp>
-        <p:nvSpPr>
-          <p:cNvPr id="3" name="Vertical Text Placeholder 2">
-            <a:extLst>
-              <a:ext uri="{FF2B5EF4-FFF2-40B4-BE49-F238E27FC236}">
-                <a16:creationId xmlns:a16="http://schemas.microsoft.com/office/drawing/2014/main" id="{07E5CE5A-9AA1-B940-AA3B-79A235D01AF6}"/>
-              </a:ext>
-            </a:extLst>
-          </p:cNvPr>
+            <a:endParaRPr lang="en-US" dirty="0"/>
+          </a:p>
+        </p:txBody>
+      </p:sp>
+      <p:sp>
+        <p:nvSpPr>
+          <p:cNvPr id="3" name="Vertical Text Placeholder 2"/>
           <p:cNvSpPr>
             <a:spLocks noGrp="1"/>
           </p:cNvSpPr>
@@ -844,49 +806,44 @@
           <a:p>
             <a:pPr lvl="0"/>
             <a:r>
-              <a:rPr lang="en-US"/>
-              <a:t>Edit Master text styles</a:t>
+              <a:rPr lang="en-US" smtClean="0"/>
+              <a:t>Click to edit Master text styles</a:t>
             </a:r>
           </a:p>
           <a:p>
             <a:pPr lvl="1"/>
             <a:r>
-              <a:rPr lang="en-US"/>
+              <a:rPr lang="en-US" smtClean="0"/>
               <a:t>Second level</a:t>
             </a:r>
           </a:p>
           <a:p>
             <a:pPr lvl="2"/>
             <a:r>
-              <a:rPr lang="en-US"/>
+              <a:rPr lang="en-US" smtClean="0"/>
               <a:t>Third level</a:t>
             </a:r>
           </a:p>
           <a:p>
             <a:pPr lvl="3"/>
             <a:r>
-              <a:rPr lang="en-US"/>
+              <a:rPr lang="en-US" smtClean="0"/>
               <a:t>Fourth level</a:t>
             </a:r>
           </a:p>
           <a:p>
             <a:pPr lvl="4"/>
             <a:r>
-              <a:rPr lang="en-US"/>
+              <a:rPr lang="en-US" smtClean="0"/>
               <a:t>Fifth level</a:t>
             </a:r>
-          </a:p>
-        </p:txBody>
-      </p:sp>
-      <p:sp>
-        <p:nvSpPr>
-          <p:cNvPr id="4" name="Date Placeholder 3">
-            <a:extLst>
-              <a:ext uri="{FF2B5EF4-FFF2-40B4-BE49-F238E27FC236}">
-                <a16:creationId xmlns:a16="http://schemas.microsoft.com/office/drawing/2014/main" id="{0175A349-671F-B241-A8BC-650ED4C3D8AA}"/>
-              </a:ext>
-            </a:extLst>
-          </p:cNvPr>
+            <a:endParaRPr lang="en-US" dirty="0"/>
+          </a:p>
+        </p:txBody>
+      </p:sp>
+      <p:sp>
+        <p:nvSpPr>
+          <p:cNvPr id="4" name="Date Placeholder 3"/>
           <p:cNvSpPr>
             <a:spLocks noGrp="1"/>
           </p:cNvSpPr>
@@ -909,13 +866,7 @@
       </p:sp>
       <p:sp>
         <p:nvSpPr>
-          <p:cNvPr id="5" name="Footer Placeholder 4">
-            <a:extLst>
-              <a:ext uri="{FF2B5EF4-FFF2-40B4-BE49-F238E27FC236}">
-                <a16:creationId xmlns:a16="http://schemas.microsoft.com/office/drawing/2014/main" id="{7F92DBBB-55DE-9A4A-925B-6E42B0AE2250}"/>
-              </a:ext>
-            </a:extLst>
-          </p:cNvPr>
+          <p:cNvPr id="5" name="Footer Placeholder 4"/>
           <p:cNvSpPr>
             <a:spLocks noGrp="1"/>
           </p:cNvSpPr>
@@ -934,13 +885,7 @@
       </p:sp>
       <p:sp>
         <p:nvSpPr>
-          <p:cNvPr id="6" name="Slide Number Placeholder 5">
-            <a:extLst>
-              <a:ext uri="{FF2B5EF4-FFF2-40B4-BE49-F238E27FC236}">
-                <a16:creationId xmlns:a16="http://schemas.microsoft.com/office/drawing/2014/main" id="{C9E4CF84-A006-AF45-89FA-52FD89CF52D1}"/>
-              </a:ext>
-            </a:extLst>
-          </p:cNvPr>
+          <p:cNvPr id="6" name="Slide Number Placeholder 5"/>
           <p:cNvSpPr>
             <a:spLocks noGrp="1"/>
           </p:cNvSpPr>
@@ -964,7 +909,7 @@
     </p:spTree>
     <p:extLst>
       <p:ext uri="{BB962C8B-B14F-4D97-AF65-F5344CB8AC3E}">
-        <p14:creationId xmlns:p14="http://schemas.microsoft.com/office/powerpoint/2010/main" val="3261025193"/>
+        <p14:creationId xmlns:p14="http://schemas.microsoft.com/office/powerpoint/2010/main" val="783230422"/>
       </p:ext>
     </p:extLst>
   </p:cSld>
@@ -993,13 +938,7 @@
       </p:grpSpPr>
       <p:sp>
         <p:nvSpPr>
-          <p:cNvPr id="2" name="Vertical Title 1">
-            <a:extLst>
-              <a:ext uri="{FF2B5EF4-FFF2-40B4-BE49-F238E27FC236}">
-                <a16:creationId xmlns:a16="http://schemas.microsoft.com/office/drawing/2014/main" id="{C41C5D2E-29E7-E549-B965-E1359C6F5582}"/>
-              </a:ext>
-            </a:extLst>
-          </p:cNvPr>
+          <p:cNvPr id="2" name="Vertical Title 1"/>
           <p:cNvSpPr>
             <a:spLocks noGrp="1"/>
           </p:cNvSpPr>
@@ -1018,21 +957,16 @@
           <a:lstStyle/>
           <a:p>
             <a:r>
-              <a:rPr lang="en-US"/>
+              <a:rPr lang="en-US" smtClean="0"/>
               <a:t>Click to edit Master title style</a:t>
             </a:r>
-          </a:p>
-        </p:txBody>
-      </p:sp>
-      <p:sp>
-        <p:nvSpPr>
-          <p:cNvPr id="3" name="Vertical Text Placeholder 2">
-            <a:extLst>
-              <a:ext uri="{FF2B5EF4-FFF2-40B4-BE49-F238E27FC236}">
-                <a16:creationId xmlns:a16="http://schemas.microsoft.com/office/drawing/2014/main" id="{ACF5B418-9428-A746-A8C6-CC46B55EC291}"/>
-              </a:ext>
-            </a:extLst>
-          </p:cNvPr>
+            <a:endParaRPr lang="en-US" dirty="0"/>
+          </a:p>
+        </p:txBody>
+      </p:sp>
+      <p:sp>
+        <p:nvSpPr>
+          <p:cNvPr id="3" name="Vertical Text Placeholder 2"/>
           <p:cNvSpPr>
             <a:spLocks noGrp="1"/>
           </p:cNvSpPr>
@@ -1052,49 +986,44 @@
           <a:p>
             <a:pPr lvl="0"/>
             <a:r>
-              <a:rPr lang="en-US"/>
-              <a:t>Edit Master text styles</a:t>
+              <a:rPr lang="en-US" smtClean="0"/>
+              <a:t>Click to edit Master text styles</a:t>
             </a:r>
           </a:p>
           <a:p>
             <a:pPr lvl="1"/>
             <a:r>
-              <a:rPr lang="en-US"/>
+              <a:rPr lang="en-US" smtClean="0"/>
               <a:t>Second level</a:t>
             </a:r>
           </a:p>
           <a:p>
             <a:pPr lvl="2"/>
             <a:r>
-              <a:rPr lang="en-US"/>
+              <a:rPr lang="en-US" smtClean="0"/>
               <a:t>Third level</a:t>
             </a:r>
           </a:p>
           <a:p>
             <a:pPr lvl="3"/>
             <a:r>
-              <a:rPr lang="en-US"/>
+              <a:rPr lang="en-US" smtClean="0"/>
               <a:t>Fourth level</a:t>
             </a:r>
           </a:p>
           <a:p>
             <a:pPr lvl="4"/>
             <a:r>
-              <a:rPr lang="en-US"/>
+              <a:rPr lang="en-US" smtClean="0"/>
               <a:t>Fifth level</a:t>
             </a:r>
-          </a:p>
-        </p:txBody>
-      </p:sp>
-      <p:sp>
-        <p:nvSpPr>
-          <p:cNvPr id="4" name="Date Placeholder 3">
-            <a:extLst>
-              <a:ext uri="{FF2B5EF4-FFF2-40B4-BE49-F238E27FC236}">
-                <a16:creationId xmlns:a16="http://schemas.microsoft.com/office/drawing/2014/main" id="{67A72081-2035-AD48-BBAB-7822D1C2E4F4}"/>
-              </a:ext>
-            </a:extLst>
-          </p:cNvPr>
+            <a:endParaRPr lang="en-US" dirty="0"/>
+          </a:p>
+        </p:txBody>
+      </p:sp>
+      <p:sp>
+        <p:nvSpPr>
+          <p:cNvPr id="4" name="Date Placeholder 3"/>
           <p:cNvSpPr>
             <a:spLocks noGrp="1"/>
           </p:cNvSpPr>
@@ -1117,13 +1046,7 @@
       </p:sp>
       <p:sp>
         <p:nvSpPr>
-          <p:cNvPr id="5" name="Footer Placeholder 4">
-            <a:extLst>
-              <a:ext uri="{FF2B5EF4-FFF2-40B4-BE49-F238E27FC236}">
-                <a16:creationId xmlns:a16="http://schemas.microsoft.com/office/drawing/2014/main" id="{2891F25F-4735-854C-9BBA-64369688B705}"/>
-              </a:ext>
-            </a:extLst>
-          </p:cNvPr>
+          <p:cNvPr id="5" name="Footer Placeholder 4"/>
           <p:cNvSpPr>
             <a:spLocks noGrp="1"/>
           </p:cNvSpPr>
@@ -1142,13 +1065,7 @@
       </p:sp>
       <p:sp>
         <p:nvSpPr>
-          <p:cNvPr id="6" name="Slide Number Placeholder 5">
-            <a:extLst>
-              <a:ext uri="{FF2B5EF4-FFF2-40B4-BE49-F238E27FC236}">
-                <a16:creationId xmlns:a16="http://schemas.microsoft.com/office/drawing/2014/main" id="{AD789969-2C04-FA45-BF3C-08C07A90D62D}"/>
-              </a:ext>
-            </a:extLst>
-          </p:cNvPr>
+          <p:cNvPr id="6" name="Slide Number Placeholder 5"/>
           <p:cNvSpPr>
             <a:spLocks noGrp="1"/>
           </p:cNvSpPr>
@@ -1172,7 +1089,7 @@
     </p:spTree>
     <p:extLst>
       <p:ext uri="{BB962C8B-B14F-4D97-AF65-F5344CB8AC3E}">
-        <p14:creationId xmlns:p14="http://schemas.microsoft.com/office/powerpoint/2010/main" val="708805648"/>
+        <p14:creationId xmlns:p14="http://schemas.microsoft.com/office/powerpoint/2010/main" val="1826430091"/>
       </p:ext>
     </p:extLst>
   </p:cSld>
@@ -1201,13 +1118,7 @@
       </p:grpSpPr>
       <p:sp>
         <p:nvSpPr>
-          <p:cNvPr id="2" name="Title 1">
-            <a:extLst>
-              <a:ext uri="{FF2B5EF4-FFF2-40B4-BE49-F238E27FC236}">
-                <a16:creationId xmlns:a16="http://schemas.microsoft.com/office/drawing/2014/main" id="{6C00166E-A89A-C642-A883-FE3089049198}"/>
-              </a:ext>
-            </a:extLst>
-          </p:cNvPr>
+          <p:cNvPr id="2" name="Title 1"/>
           <p:cNvSpPr>
             <a:spLocks noGrp="1"/>
           </p:cNvSpPr>
@@ -1221,21 +1132,16 @@
           <a:lstStyle/>
           <a:p>
             <a:r>
-              <a:rPr lang="en-US"/>
+              <a:rPr lang="en-US" smtClean="0"/>
               <a:t>Click to edit Master title style</a:t>
             </a:r>
-          </a:p>
-        </p:txBody>
-      </p:sp>
-      <p:sp>
-        <p:nvSpPr>
-          <p:cNvPr id="3" name="Content Placeholder 2">
-            <a:extLst>
-              <a:ext uri="{FF2B5EF4-FFF2-40B4-BE49-F238E27FC236}">
-                <a16:creationId xmlns:a16="http://schemas.microsoft.com/office/drawing/2014/main" id="{40D01085-7AE0-0348-92C3-B96C3AEC5FC1}"/>
-              </a:ext>
-            </a:extLst>
-          </p:cNvPr>
+            <a:endParaRPr lang="en-US" dirty="0"/>
+          </a:p>
+        </p:txBody>
+      </p:sp>
+      <p:sp>
+        <p:nvSpPr>
+          <p:cNvPr id="3" name="Content Placeholder 2"/>
           <p:cNvSpPr>
             <a:spLocks noGrp="1"/>
           </p:cNvSpPr>
@@ -1250,49 +1156,44 @@
           <a:p>
             <a:pPr lvl="0"/>
             <a:r>
-              <a:rPr lang="en-US"/>
-              <a:t>Edit Master text styles</a:t>
+              <a:rPr lang="en-US" smtClean="0"/>
+              <a:t>Click to edit Master text styles</a:t>
             </a:r>
           </a:p>
           <a:p>
             <a:pPr lvl="1"/>
             <a:r>
-              <a:rPr lang="en-US"/>
+              <a:rPr lang="en-US" smtClean="0"/>
               <a:t>Second level</a:t>
             </a:r>
           </a:p>
           <a:p>
             <a:pPr lvl="2"/>
             <a:r>
-              <a:rPr lang="en-US"/>
+              <a:rPr lang="en-US" smtClean="0"/>
               <a:t>Third level</a:t>
             </a:r>
           </a:p>
           <a:p>
             <a:pPr lvl="3"/>
             <a:r>
-              <a:rPr lang="en-US"/>
+              <a:rPr lang="en-US" smtClean="0"/>
               <a:t>Fourth level</a:t>
             </a:r>
           </a:p>
           <a:p>
             <a:pPr lvl="4"/>
             <a:r>
-              <a:rPr lang="en-US"/>
+              <a:rPr lang="en-US" smtClean="0"/>
               <a:t>Fifth level</a:t>
             </a:r>
-          </a:p>
-        </p:txBody>
-      </p:sp>
-      <p:sp>
-        <p:nvSpPr>
-          <p:cNvPr id="4" name="Date Placeholder 3">
-            <a:extLst>
-              <a:ext uri="{FF2B5EF4-FFF2-40B4-BE49-F238E27FC236}">
-                <a16:creationId xmlns:a16="http://schemas.microsoft.com/office/drawing/2014/main" id="{113D4DC3-6DFD-7C41-BF82-108FB065B46C}"/>
-              </a:ext>
-            </a:extLst>
-          </p:cNvPr>
+            <a:endParaRPr lang="en-US" dirty="0"/>
+          </a:p>
+        </p:txBody>
+      </p:sp>
+      <p:sp>
+        <p:nvSpPr>
+          <p:cNvPr id="4" name="Date Placeholder 3"/>
           <p:cNvSpPr>
             <a:spLocks noGrp="1"/>
           </p:cNvSpPr>
@@ -1315,13 +1216,7 @@
       </p:sp>
       <p:sp>
         <p:nvSpPr>
-          <p:cNvPr id="5" name="Footer Placeholder 4">
-            <a:extLst>
-              <a:ext uri="{FF2B5EF4-FFF2-40B4-BE49-F238E27FC236}">
-                <a16:creationId xmlns:a16="http://schemas.microsoft.com/office/drawing/2014/main" id="{022729D7-D3BC-044B-9816-DB4AB94FDDDA}"/>
-              </a:ext>
-            </a:extLst>
-          </p:cNvPr>
+          <p:cNvPr id="5" name="Footer Placeholder 4"/>
           <p:cNvSpPr>
             <a:spLocks noGrp="1"/>
           </p:cNvSpPr>
@@ -1340,13 +1235,7 @@
       </p:sp>
       <p:sp>
         <p:nvSpPr>
-          <p:cNvPr id="6" name="Slide Number Placeholder 5">
-            <a:extLst>
-              <a:ext uri="{FF2B5EF4-FFF2-40B4-BE49-F238E27FC236}">
-                <a16:creationId xmlns:a16="http://schemas.microsoft.com/office/drawing/2014/main" id="{45D1B475-D6D7-8647-AF46-A8EF261DCA80}"/>
-              </a:ext>
-            </a:extLst>
-          </p:cNvPr>
+          <p:cNvPr id="6" name="Slide Number Placeholder 5"/>
           <p:cNvSpPr>
             <a:spLocks noGrp="1"/>
           </p:cNvSpPr>
@@ -1370,7 +1259,7 @@
     </p:spTree>
     <p:extLst>
       <p:ext uri="{BB962C8B-B14F-4D97-AF65-F5344CB8AC3E}">
-        <p14:creationId xmlns:p14="http://schemas.microsoft.com/office/powerpoint/2010/main" val="2100370264"/>
+        <p14:creationId xmlns:p14="http://schemas.microsoft.com/office/powerpoint/2010/main" val="1255669071"/>
       </p:ext>
     </p:extLst>
   </p:cSld>
@@ -1399,13 +1288,7 @@
       </p:grpSpPr>
       <p:sp>
         <p:nvSpPr>
-          <p:cNvPr id="2" name="Title 1">
-            <a:extLst>
-              <a:ext uri="{FF2B5EF4-FFF2-40B4-BE49-F238E27FC236}">
-                <a16:creationId xmlns:a16="http://schemas.microsoft.com/office/drawing/2014/main" id="{9AEAA903-6839-5C46-8F01-645CCCE2FE8C}"/>
-              </a:ext>
-            </a:extLst>
-          </p:cNvPr>
+          <p:cNvPr id="2" name="Title 1"/>
           <p:cNvSpPr>
             <a:spLocks noGrp="1"/>
           </p:cNvSpPr>
@@ -1428,21 +1311,16 @@
           </a:lstStyle>
           <a:p>
             <a:r>
-              <a:rPr lang="en-US"/>
+              <a:rPr lang="en-US" smtClean="0"/>
               <a:t>Click to edit Master title style</a:t>
             </a:r>
-          </a:p>
-        </p:txBody>
-      </p:sp>
-      <p:sp>
-        <p:nvSpPr>
-          <p:cNvPr id="3" name="Text Placeholder 2">
-            <a:extLst>
-              <a:ext uri="{FF2B5EF4-FFF2-40B4-BE49-F238E27FC236}">
-                <a16:creationId xmlns:a16="http://schemas.microsoft.com/office/drawing/2014/main" id="{B7020139-0AAE-AF4B-986B-BAC7F2EA5F56}"/>
-              </a:ext>
-            </a:extLst>
-          </p:cNvPr>
+            <a:endParaRPr lang="en-US" dirty="0"/>
+          </a:p>
+        </p:txBody>
+      </p:sp>
+      <p:sp>
+        <p:nvSpPr>
+          <p:cNvPr id="3" name="Text Placeholder 2"/>
           <p:cNvSpPr>
             <a:spLocks noGrp="1"/>
           </p:cNvSpPr>
@@ -1553,21 +1431,15 @@
           <a:p>
             <a:pPr lvl="0"/>
             <a:r>
-              <a:rPr lang="en-US"/>
-              <a:t>Edit Master text styles</a:t>
-            </a:r>
-          </a:p>
-        </p:txBody>
-      </p:sp>
-      <p:sp>
-        <p:nvSpPr>
-          <p:cNvPr id="4" name="Date Placeholder 3">
-            <a:extLst>
-              <a:ext uri="{FF2B5EF4-FFF2-40B4-BE49-F238E27FC236}">
-                <a16:creationId xmlns:a16="http://schemas.microsoft.com/office/drawing/2014/main" id="{C7B16EB0-55BA-9549-A071-36A6A76C4786}"/>
-              </a:ext>
-            </a:extLst>
-          </p:cNvPr>
+              <a:rPr lang="en-US" smtClean="0"/>
+              <a:t>Click to edit Master text styles</a:t>
+            </a:r>
+          </a:p>
+        </p:txBody>
+      </p:sp>
+      <p:sp>
+        <p:nvSpPr>
+          <p:cNvPr id="4" name="Date Placeholder 3"/>
           <p:cNvSpPr>
             <a:spLocks noGrp="1"/>
           </p:cNvSpPr>
@@ -1590,13 +1462,7 @@
       </p:sp>
       <p:sp>
         <p:nvSpPr>
-          <p:cNvPr id="5" name="Footer Placeholder 4">
-            <a:extLst>
-              <a:ext uri="{FF2B5EF4-FFF2-40B4-BE49-F238E27FC236}">
-                <a16:creationId xmlns:a16="http://schemas.microsoft.com/office/drawing/2014/main" id="{63E19F8A-50F2-4745-926D-1A30201DA7CD}"/>
-              </a:ext>
-            </a:extLst>
-          </p:cNvPr>
+          <p:cNvPr id="5" name="Footer Placeholder 4"/>
           <p:cNvSpPr>
             <a:spLocks noGrp="1"/>
           </p:cNvSpPr>
@@ -1615,13 +1481,7 @@
       </p:sp>
       <p:sp>
         <p:nvSpPr>
-          <p:cNvPr id="6" name="Slide Number Placeholder 5">
-            <a:extLst>
-              <a:ext uri="{FF2B5EF4-FFF2-40B4-BE49-F238E27FC236}">
-                <a16:creationId xmlns:a16="http://schemas.microsoft.com/office/drawing/2014/main" id="{50B92042-4B88-0943-A6EB-967372436FC2}"/>
-              </a:ext>
-            </a:extLst>
-          </p:cNvPr>
+          <p:cNvPr id="6" name="Slide Number Placeholder 5"/>
           <p:cNvSpPr>
             <a:spLocks noGrp="1"/>
           </p:cNvSpPr>
@@ -1645,7 +1505,7 @@
     </p:spTree>
     <p:extLst>
       <p:ext uri="{BB962C8B-B14F-4D97-AF65-F5344CB8AC3E}">
-        <p14:creationId xmlns:p14="http://schemas.microsoft.com/office/powerpoint/2010/main" val="4154197706"/>
+        <p14:creationId xmlns:p14="http://schemas.microsoft.com/office/powerpoint/2010/main" val="708277228"/>
       </p:ext>
     </p:extLst>
   </p:cSld>
@@ -1674,13 +1534,7 @@
       </p:grpSpPr>
       <p:sp>
         <p:nvSpPr>
-          <p:cNvPr id="2" name="Title 1">
-            <a:extLst>
-              <a:ext uri="{FF2B5EF4-FFF2-40B4-BE49-F238E27FC236}">
-                <a16:creationId xmlns:a16="http://schemas.microsoft.com/office/drawing/2014/main" id="{E282AD90-35F3-2844-8CDA-B4784FF48049}"/>
-              </a:ext>
-            </a:extLst>
-          </p:cNvPr>
+          <p:cNvPr id="2" name="Title 1"/>
           <p:cNvSpPr>
             <a:spLocks noGrp="1"/>
           </p:cNvSpPr>
@@ -1694,21 +1548,16 @@
           <a:lstStyle/>
           <a:p>
             <a:r>
-              <a:rPr lang="en-US"/>
+              <a:rPr lang="en-US" smtClean="0"/>
               <a:t>Click to edit Master title style</a:t>
             </a:r>
-          </a:p>
-        </p:txBody>
-      </p:sp>
-      <p:sp>
-        <p:nvSpPr>
-          <p:cNvPr id="3" name="Content Placeholder 2">
-            <a:extLst>
-              <a:ext uri="{FF2B5EF4-FFF2-40B4-BE49-F238E27FC236}">
-                <a16:creationId xmlns:a16="http://schemas.microsoft.com/office/drawing/2014/main" id="{74DB0742-DF79-5E4C-8D7C-008403C3F78B}"/>
-              </a:ext>
-            </a:extLst>
-          </p:cNvPr>
+            <a:endParaRPr lang="en-US" dirty="0"/>
+          </a:p>
+        </p:txBody>
+      </p:sp>
+      <p:sp>
+        <p:nvSpPr>
+          <p:cNvPr id="3" name="Content Placeholder 2"/>
           <p:cNvSpPr>
             <a:spLocks noGrp="1"/>
           </p:cNvSpPr>
@@ -1728,49 +1577,44 @@
           <a:p>
             <a:pPr lvl="0"/>
             <a:r>
-              <a:rPr lang="en-US"/>
-              <a:t>Edit Master text styles</a:t>
+              <a:rPr lang="en-US" smtClean="0"/>
+              <a:t>Click to edit Master text styles</a:t>
             </a:r>
           </a:p>
           <a:p>
             <a:pPr lvl="1"/>
             <a:r>
-              <a:rPr lang="en-US"/>
+              <a:rPr lang="en-US" smtClean="0"/>
               <a:t>Second level</a:t>
             </a:r>
           </a:p>
           <a:p>
             <a:pPr lvl="2"/>
             <a:r>
-              <a:rPr lang="en-US"/>
+              <a:rPr lang="en-US" smtClean="0"/>
               <a:t>Third level</a:t>
             </a:r>
           </a:p>
           <a:p>
             <a:pPr lvl="3"/>
             <a:r>
-              <a:rPr lang="en-US"/>
+              <a:rPr lang="en-US" smtClean="0"/>
               <a:t>Fourth level</a:t>
             </a:r>
           </a:p>
           <a:p>
             <a:pPr lvl="4"/>
             <a:r>
-              <a:rPr lang="en-US"/>
+              <a:rPr lang="en-US" smtClean="0"/>
               <a:t>Fifth level</a:t>
             </a:r>
-          </a:p>
-        </p:txBody>
-      </p:sp>
-      <p:sp>
-        <p:nvSpPr>
-          <p:cNvPr id="4" name="Content Placeholder 3">
-            <a:extLst>
-              <a:ext uri="{FF2B5EF4-FFF2-40B4-BE49-F238E27FC236}">
-                <a16:creationId xmlns:a16="http://schemas.microsoft.com/office/drawing/2014/main" id="{48C75124-C73F-AE4F-B793-3A414A4DA473}"/>
-              </a:ext>
-            </a:extLst>
-          </p:cNvPr>
+            <a:endParaRPr lang="en-US" dirty="0"/>
+          </a:p>
+        </p:txBody>
+      </p:sp>
+      <p:sp>
+        <p:nvSpPr>
+          <p:cNvPr id="4" name="Content Placeholder 3"/>
           <p:cNvSpPr>
             <a:spLocks noGrp="1"/>
           </p:cNvSpPr>
@@ -1790,49 +1634,44 @@
           <a:p>
             <a:pPr lvl="0"/>
             <a:r>
-              <a:rPr lang="en-US"/>
-              <a:t>Edit Master text styles</a:t>
+              <a:rPr lang="en-US" smtClean="0"/>
+              <a:t>Click to edit Master text styles</a:t>
             </a:r>
           </a:p>
           <a:p>
             <a:pPr lvl="1"/>
             <a:r>
-              <a:rPr lang="en-US"/>
+              <a:rPr lang="en-US" smtClean="0"/>
               <a:t>Second level</a:t>
             </a:r>
           </a:p>
           <a:p>
             <a:pPr lvl="2"/>
             <a:r>
-              <a:rPr lang="en-US"/>
+              <a:rPr lang="en-US" smtClean="0"/>
               <a:t>Third level</a:t>
             </a:r>
           </a:p>
           <a:p>
             <a:pPr lvl="3"/>
             <a:r>
-              <a:rPr lang="en-US"/>
+              <a:rPr lang="en-US" smtClean="0"/>
               <a:t>Fourth level</a:t>
             </a:r>
           </a:p>
           <a:p>
             <a:pPr lvl="4"/>
             <a:r>
-              <a:rPr lang="en-US"/>
+              <a:rPr lang="en-US" smtClean="0"/>
               <a:t>Fifth level</a:t>
             </a:r>
-          </a:p>
-        </p:txBody>
-      </p:sp>
-      <p:sp>
-        <p:nvSpPr>
-          <p:cNvPr id="5" name="Date Placeholder 4">
-            <a:extLst>
-              <a:ext uri="{FF2B5EF4-FFF2-40B4-BE49-F238E27FC236}">
-                <a16:creationId xmlns:a16="http://schemas.microsoft.com/office/drawing/2014/main" id="{F7EC7D74-0262-3A4F-90B0-5B64729FA794}"/>
-              </a:ext>
-            </a:extLst>
-          </p:cNvPr>
+            <a:endParaRPr lang="en-US" dirty="0"/>
+          </a:p>
+        </p:txBody>
+      </p:sp>
+      <p:sp>
+        <p:nvSpPr>
+          <p:cNvPr id="5" name="Date Placeholder 4"/>
           <p:cNvSpPr>
             <a:spLocks noGrp="1"/>
           </p:cNvSpPr>
@@ -1855,13 +1694,7 @@
       </p:sp>
       <p:sp>
         <p:nvSpPr>
-          <p:cNvPr id="6" name="Footer Placeholder 5">
-            <a:extLst>
-              <a:ext uri="{FF2B5EF4-FFF2-40B4-BE49-F238E27FC236}">
-                <a16:creationId xmlns:a16="http://schemas.microsoft.com/office/drawing/2014/main" id="{D4DA2AA2-080B-FF41-A10F-11979D29E331}"/>
-              </a:ext>
-            </a:extLst>
-          </p:cNvPr>
+          <p:cNvPr id="6" name="Footer Placeholder 5"/>
           <p:cNvSpPr>
             <a:spLocks noGrp="1"/>
           </p:cNvSpPr>
@@ -1880,13 +1713,7 @@
       </p:sp>
       <p:sp>
         <p:nvSpPr>
-          <p:cNvPr id="7" name="Slide Number Placeholder 6">
-            <a:extLst>
-              <a:ext uri="{FF2B5EF4-FFF2-40B4-BE49-F238E27FC236}">
-                <a16:creationId xmlns:a16="http://schemas.microsoft.com/office/drawing/2014/main" id="{E8B670CD-AA55-4D42-8C70-5AED6DAE113E}"/>
-              </a:ext>
-            </a:extLst>
-          </p:cNvPr>
+          <p:cNvPr id="7" name="Slide Number Placeholder 6"/>
           <p:cNvSpPr>
             <a:spLocks noGrp="1"/>
           </p:cNvSpPr>
@@ -1910,7 +1737,7 @@
     </p:spTree>
     <p:extLst>
       <p:ext uri="{BB962C8B-B14F-4D97-AF65-F5344CB8AC3E}">
-        <p14:creationId xmlns:p14="http://schemas.microsoft.com/office/powerpoint/2010/main" val="2553900263"/>
+        <p14:creationId xmlns:p14="http://schemas.microsoft.com/office/powerpoint/2010/main" val="513515675"/>
       </p:ext>
     </p:extLst>
   </p:cSld>
@@ -1939,13 +1766,7 @@
       </p:grpSpPr>
       <p:sp>
         <p:nvSpPr>
-          <p:cNvPr id="2" name="Title 1">
-            <a:extLst>
-              <a:ext uri="{FF2B5EF4-FFF2-40B4-BE49-F238E27FC236}">
-                <a16:creationId xmlns:a16="http://schemas.microsoft.com/office/drawing/2014/main" id="{4FFD12FB-47CB-224E-BC5B-280DD7B95401}"/>
-              </a:ext>
-            </a:extLst>
-          </p:cNvPr>
+          <p:cNvPr id="2" name="Title 1"/>
           <p:cNvSpPr>
             <a:spLocks noGrp="1"/>
           </p:cNvSpPr>
@@ -1964,21 +1785,16 @@
           <a:lstStyle/>
           <a:p>
             <a:r>
-              <a:rPr lang="en-US"/>
+              <a:rPr lang="en-US" smtClean="0"/>
               <a:t>Click to edit Master title style</a:t>
             </a:r>
-          </a:p>
-        </p:txBody>
-      </p:sp>
-      <p:sp>
-        <p:nvSpPr>
-          <p:cNvPr id="3" name="Text Placeholder 2">
-            <a:extLst>
-              <a:ext uri="{FF2B5EF4-FFF2-40B4-BE49-F238E27FC236}">
-                <a16:creationId xmlns:a16="http://schemas.microsoft.com/office/drawing/2014/main" id="{6D2614A2-098F-C442-B42A-B403AB13B45E}"/>
-              </a:ext>
-            </a:extLst>
-          </p:cNvPr>
+            <a:endParaRPr lang="en-US" dirty="0"/>
+          </a:p>
+        </p:txBody>
+      </p:sp>
+      <p:sp>
+        <p:nvSpPr>
+          <p:cNvPr id="3" name="Text Placeholder 2"/>
           <p:cNvSpPr>
             <a:spLocks noGrp="1"/>
           </p:cNvSpPr>
@@ -2035,21 +1851,15 @@
           <a:p>
             <a:pPr lvl="0"/>
             <a:r>
-              <a:rPr lang="en-US"/>
-              <a:t>Edit Master text styles</a:t>
-            </a:r>
-          </a:p>
-        </p:txBody>
-      </p:sp>
-      <p:sp>
-        <p:nvSpPr>
-          <p:cNvPr id="4" name="Content Placeholder 3">
-            <a:extLst>
-              <a:ext uri="{FF2B5EF4-FFF2-40B4-BE49-F238E27FC236}">
-                <a16:creationId xmlns:a16="http://schemas.microsoft.com/office/drawing/2014/main" id="{154A7FAA-B64A-E34E-A31E-80631B6FCFFD}"/>
-              </a:ext>
-            </a:extLst>
-          </p:cNvPr>
+              <a:rPr lang="en-US" smtClean="0"/>
+              <a:t>Click to edit Master text styles</a:t>
+            </a:r>
+          </a:p>
+        </p:txBody>
+      </p:sp>
+      <p:sp>
+        <p:nvSpPr>
+          <p:cNvPr id="4" name="Content Placeholder 3"/>
           <p:cNvSpPr>
             <a:spLocks noGrp="1"/>
           </p:cNvSpPr>
@@ -2069,49 +1879,44 @@
           <a:p>
             <a:pPr lvl="0"/>
             <a:r>
-              <a:rPr lang="en-US"/>
-              <a:t>Edit Master text styles</a:t>
+              <a:rPr lang="en-US" smtClean="0"/>
+              <a:t>Click to edit Master text styles</a:t>
             </a:r>
           </a:p>
           <a:p>
             <a:pPr lvl="1"/>
             <a:r>
-              <a:rPr lang="en-US"/>
+              <a:rPr lang="en-US" smtClean="0"/>
               <a:t>Second level</a:t>
             </a:r>
           </a:p>
           <a:p>
             <a:pPr lvl="2"/>
             <a:r>
-              <a:rPr lang="en-US"/>
+              <a:rPr lang="en-US" smtClean="0"/>
               <a:t>Third level</a:t>
             </a:r>
           </a:p>
           <a:p>
             <a:pPr lvl="3"/>
             <a:r>
-              <a:rPr lang="en-US"/>
+              <a:rPr lang="en-US" smtClean="0"/>
               <a:t>Fourth level</a:t>
             </a:r>
           </a:p>
           <a:p>
             <a:pPr lvl="4"/>
             <a:r>
-              <a:rPr lang="en-US"/>
+              <a:rPr lang="en-US" smtClean="0"/>
               <a:t>Fifth level</a:t>
             </a:r>
-          </a:p>
-        </p:txBody>
-      </p:sp>
-      <p:sp>
-        <p:nvSpPr>
-          <p:cNvPr id="5" name="Text Placeholder 4">
-            <a:extLst>
-              <a:ext uri="{FF2B5EF4-FFF2-40B4-BE49-F238E27FC236}">
-                <a16:creationId xmlns:a16="http://schemas.microsoft.com/office/drawing/2014/main" id="{61DE1747-6DA7-AF41-BB1C-5E2BA8EA87E3}"/>
-              </a:ext>
-            </a:extLst>
-          </p:cNvPr>
+            <a:endParaRPr lang="en-US" dirty="0"/>
+          </a:p>
+        </p:txBody>
+      </p:sp>
+      <p:sp>
+        <p:nvSpPr>
+          <p:cNvPr id="5" name="Text Placeholder 4"/>
           <p:cNvSpPr>
             <a:spLocks noGrp="1"/>
           </p:cNvSpPr>
@@ -2168,21 +1973,15 @@
           <a:p>
             <a:pPr lvl="0"/>
             <a:r>
-              <a:rPr lang="en-US"/>
-              <a:t>Edit Master text styles</a:t>
-            </a:r>
-          </a:p>
-        </p:txBody>
-      </p:sp>
-      <p:sp>
-        <p:nvSpPr>
-          <p:cNvPr id="6" name="Content Placeholder 5">
-            <a:extLst>
-              <a:ext uri="{FF2B5EF4-FFF2-40B4-BE49-F238E27FC236}">
-                <a16:creationId xmlns:a16="http://schemas.microsoft.com/office/drawing/2014/main" id="{74FF8E48-6CA2-7C4D-9060-60879246C03B}"/>
-              </a:ext>
-            </a:extLst>
-          </p:cNvPr>
+              <a:rPr lang="en-US" smtClean="0"/>
+              <a:t>Click to edit Master text styles</a:t>
+            </a:r>
+          </a:p>
+        </p:txBody>
+      </p:sp>
+      <p:sp>
+        <p:nvSpPr>
+          <p:cNvPr id="6" name="Content Placeholder 5"/>
           <p:cNvSpPr>
             <a:spLocks noGrp="1"/>
           </p:cNvSpPr>
@@ -2202,49 +2001,44 @@
           <a:p>
             <a:pPr lvl="0"/>
             <a:r>
-              <a:rPr lang="en-US"/>
-              <a:t>Edit Master text styles</a:t>
+              <a:rPr lang="en-US" smtClean="0"/>
+              <a:t>Click to edit Master text styles</a:t>
             </a:r>
           </a:p>
           <a:p>
             <a:pPr lvl="1"/>
             <a:r>
-              <a:rPr lang="en-US"/>
+              <a:rPr lang="en-US" smtClean="0"/>
               <a:t>Second level</a:t>
             </a:r>
           </a:p>
           <a:p>
             <a:pPr lvl="2"/>
             <a:r>
-              <a:rPr lang="en-US"/>
+              <a:rPr lang="en-US" smtClean="0"/>
               <a:t>Third level</a:t>
             </a:r>
           </a:p>
           <a:p>
             <a:pPr lvl="3"/>
             <a:r>
-              <a:rPr lang="en-US"/>
+              <a:rPr lang="en-US" smtClean="0"/>
               <a:t>Fourth level</a:t>
             </a:r>
           </a:p>
           <a:p>
             <a:pPr lvl="4"/>
             <a:r>
-              <a:rPr lang="en-US"/>
+              <a:rPr lang="en-US" smtClean="0"/>
               <a:t>Fifth level</a:t>
             </a:r>
-          </a:p>
-        </p:txBody>
-      </p:sp>
-      <p:sp>
-        <p:nvSpPr>
-          <p:cNvPr id="7" name="Date Placeholder 6">
-            <a:extLst>
-              <a:ext uri="{FF2B5EF4-FFF2-40B4-BE49-F238E27FC236}">
-                <a16:creationId xmlns:a16="http://schemas.microsoft.com/office/drawing/2014/main" id="{429243C0-DD64-EC4E-9F59-CE1F7F48064B}"/>
-              </a:ext>
-            </a:extLst>
-          </p:cNvPr>
+            <a:endParaRPr lang="en-US" dirty="0"/>
+          </a:p>
+        </p:txBody>
+      </p:sp>
+      <p:sp>
+        <p:nvSpPr>
+          <p:cNvPr id="7" name="Date Placeholder 6"/>
           <p:cNvSpPr>
             <a:spLocks noGrp="1"/>
           </p:cNvSpPr>
@@ -2267,13 +2061,7 @@
       </p:sp>
       <p:sp>
         <p:nvSpPr>
-          <p:cNvPr id="8" name="Footer Placeholder 7">
-            <a:extLst>
-              <a:ext uri="{FF2B5EF4-FFF2-40B4-BE49-F238E27FC236}">
-                <a16:creationId xmlns:a16="http://schemas.microsoft.com/office/drawing/2014/main" id="{82CAD271-59BB-1F4B-82DB-A3D02E1A62CA}"/>
-              </a:ext>
-            </a:extLst>
-          </p:cNvPr>
+          <p:cNvPr id="8" name="Footer Placeholder 7"/>
           <p:cNvSpPr>
             <a:spLocks noGrp="1"/>
           </p:cNvSpPr>
@@ -2292,13 +2080,7 @@
       </p:sp>
       <p:sp>
         <p:nvSpPr>
-          <p:cNvPr id="9" name="Slide Number Placeholder 8">
-            <a:extLst>
-              <a:ext uri="{FF2B5EF4-FFF2-40B4-BE49-F238E27FC236}">
-                <a16:creationId xmlns:a16="http://schemas.microsoft.com/office/drawing/2014/main" id="{670E8B4A-1863-1D4D-AD04-0366CF57F8A9}"/>
-              </a:ext>
-            </a:extLst>
-          </p:cNvPr>
+          <p:cNvPr id="9" name="Slide Number Placeholder 8"/>
           <p:cNvSpPr>
             <a:spLocks noGrp="1"/>
           </p:cNvSpPr>
@@ -2322,7 +2104,7 @@
     </p:spTree>
     <p:extLst>
       <p:ext uri="{BB962C8B-B14F-4D97-AF65-F5344CB8AC3E}">
-        <p14:creationId xmlns:p14="http://schemas.microsoft.com/office/powerpoint/2010/main" val="74958216"/>
+        <p14:creationId xmlns:p14="http://schemas.microsoft.com/office/powerpoint/2010/main" val="2068656079"/>
       </p:ext>
     </p:extLst>
   </p:cSld>
@@ -2351,13 +2133,7 @@
       </p:grpSpPr>
       <p:sp>
         <p:nvSpPr>
-          <p:cNvPr id="2" name="Title 1">
-            <a:extLst>
-              <a:ext uri="{FF2B5EF4-FFF2-40B4-BE49-F238E27FC236}">
-                <a16:creationId xmlns:a16="http://schemas.microsoft.com/office/drawing/2014/main" id="{ED583DDB-0B0C-A741-97C0-2719B5DFC77E}"/>
-              </a:ext>
-            </a:extLst>
-          </p:cNvPr>
+          <p:cNvPr id="2" name="Title 1"/>
           <p:cNvSpPr>
             <a:spLocks noGrp="1"/>
           </p:cNvSpPr>
@@ -2371,21 +2147,16 @@
           <a:lstStyle/>
           <a:p>
             <a:r>
-              <a:rPr lang="en-US"/>
+              <a:rPr lang="en-US" smtClean="0"/>
               <a:t>Click to edit Master title style</a:t>
             </a:r>
-          </a:p>
-        </p:txBody>
-      </p:sp>
-      <p:sp>
-        <p:nvSpPr>
-          <p:cNvPr id="3" name="Date Placeholder 2">
-            <a:extLst>
-              <a:ext uri="{FF2B5EF4-FFF2-40B4-BE49-F238E27FC236}">
-                <a16:creationId xmlns:a16="http://schemas.microsoft.com/office/drawing/2014/main" id="{2137ED1A-8B2E-8E49-9005-83B7C13A01E7}"/>
-              </a:ext>
-            </a:extLst>
-          </p:cNvPr>
+            <a:endParaRPr lang="en-US" dirty="0"/>
+          </a:p>
+        </p:txBody>
+      </p:sp>
+      <p:sp>
+        <p:nvSpPr>
+          <p:cNvPr id="3" name="Date Placeholder 2"/>
           <p:cNvSpPr>
             <a:spLocks noGrp="1"/>
           </p:cNvSpPr>
@@ -2408,13 +2179,7 @@
       </p:sp>
       <p:sp>
         <p:nvSpPr>
-          <p:cNvPr id="4" name="Footer Placeholder 3">
-            <a:extLst>
-              <a:ext uri="{FF2B5EF4-FFF2-40B4-BE49-F238E27FC236}">
-                <a16:creationId xmlns:a16="http://schemas.microsoft.com/office/drawing/2014/main" id="{FA8DA676-EF93-584C-8A79-EC052E1693A4}"/>
-              </a:ext>
-            </a:extLst>
-          </p:cNvPr>
+          <p:cNvPr id="4" name="Footer Placeholder 3"/>
           <p:cNvSpPr>
             <a:spLocks noGrp="1"/>
           </p:cNvSpPr>
@@ -2433,13 +2198,7 @@
       </p:sp>
       <p:sp>
         <p:nvSpPr>
-          <p:cNvPr id="5" name="Slide Number Placeholder 4">
-            <a:extLst>
-              <a:ext uri="{FF2B5EF4-FFF2-40B4-BE49-F238E27FC236}">
-                <a16:creationId xmlns:a16="http://schemas.microsoft.com/office/drawing/2014/main" id="{AE78F5D3-7A08-B748-87A6-B6299038E528}"/>
-              </a:ext>
-            </a:extLst>
-          </p:cNvPr>
+          <p:cNvPr id="5" name="Slide Number Placeholder 4"/>
           <p:cNvSpPr>
             <a:spLocks noGrp="1"/>
           </p:cNvSpPr>
@@ -2463,7 +2222,7 @@
     </p:spTree>
     <p:extLst>
       <p:ext uri="{BB962C8B-B14F-4D97-AF65-F5344CB8AC3E}">
-        <p14:creationId xmlns:p14="http://schemas.microsoft.com/office/powerpoint/2010/main" val="3938583890"/>
+        <p14:creationId xmlns:p14="http://schemas.microsoft.com/office/powerpoint/2010/main" val="142474823"/>
       </p:ext>
     </p:extLst>
   </p:cSld>
@@ -2492,13 +2251,7 @@
       </p:grpSpPr>
       <p:sp>
         <p:nvSpPr>
-          <p:cNvPr id="2" name="Date Placeholder 1">
-            <a:extLst>
-              <a:ext uri="{FF2B5EF4-FFF2-40B4-BE49-F238E27FC236}">
-                <a16:creationId xmlns:a16="http://schemas.microsoft.com/office/drawing/2014/main" id="{B61FD412-7EBD-6F4F-8BD9-92B9238E53A6}"/>
-              </a:ext>
-            </a:extLst>
-          </p:cNvPr>
+          <p:cNvPr id="2" name="Date Placeholder 1"/>
           <p:cNvSpPr>
             <a:spLocks noGrp="1"/>
           </p:cNvSpPr>
@@ -2521,13 +2274,7 @@
       </p:sp>
       <p:sp>
         <p:nvSpPr>
-          <p:cNvPr id="3" name="Footer Placeholder 2">
-            <a:extLst>
-              <a:ext uri="{FF2B5EF4-FFF2-40B4-BE49-F238E27FC236}">
-                <a16:creationId xmlns:a16="http://schemas.microsoft.com/office/drawing/2014/main" id="{70D5C045-4FB3-394A-80E4-3224FCBA7448}"/>
-              </a:ext>
-            </a:extLst>
-          </p:cNvPr>
+          <p:cNvPr id="3" name="Footer Placeholder 2"/>
           <p:cNvSpPr>
             <a:spLocks noGrp="1"/>
           </p:cNvSpPr>
@@ -2546,13 +2293,7 @@
       </p:sp>
       <p:sp>
         <p:nvSpPr>
-          <p:cNvPr id="4" name="Slide Number Placeholder 3">
-            <a:extLst>
-              <a:ext uri="{FF2B5EF4-FFF2-40B4-BE49-F238E27FC236}">
-                <a16:creationId xmlns:a16="http://schemas.microsoft.com/office/drawing/2014/main" id="{652350A0-0173-374D-89C4-CF1DF05C6028}"/>
-              </a:ext>
-            </a:extLst>
-          </p:cNvPr>
+          <p:cNvPr id="4" name="Slide Number Placeholder 3"/>
           <p:cNvSpPr>
             <a:spLocks noGrp="1"/>
           </p:cNvSpPr>
@@ -2576,7 +2317,7 @@
     </p:spTree>
     <p:extLst>
       <p:ext uri="{BB962C8B-B14F-4D97-AF65-F5344CB8AC3E}">
-        <p14:creationId xmlns:p14="http://schemas.microsoft.com/office/powerpoint/2010/main" val="2455727378"/>
+        <p14:creationId xmlns:p14="http://schemas.microsoft.com/office/powerpoint/2010/main" val="130083756"/>
       </p:ext>
     </p:extLst>
   </p:cSld>
@@ -2605,13 +2346,7 @@
       </p:grpSpPr>
       <p:sp>
         <p:nvSpPr>
-          <p:cNvPr id="2" name="Title 1">
-            <a:extLst>
-              <a:ext uri="{FF2B5EF4-FFF2-40B4-BE49-F238E27FC236}">
-                <a16:creationId xmlns:a16="http://schemas.microsoft.com/office/drawing/2014/main" id="{0D795029-9DDC-9C47-B113-D953CC3A346C}"/>
-              </a:ext>
-            </a:extLst>
-          </p:cNvPr>
+          <p:cNvPr id="2" name="Title 1"/>
           <p:cNvSpPr>
             <a:spLocks noGrp="1"/>
           </p:cNvSpPr>
@@ -2634,21 +2369,16 @@
           </a:lstStyle>
           <a:p>
             <a:r>
-              <a:rPr lang="en-US"/>
+              <a:rPr lang="en-US" smtClean="0"/>
               <a:t>Click to edit Master title style</a:t>
             </a:r>
-          </a:p>
-        </p:txBody>
-      </p:sp>
-      <p:sp>
-        <p:nvSpPr>
-          <p:cNvPr id="3" name="Content Placeholder 2">
-            <a:extLst>
-              <a:ext uri="{FF2B5EF4-FFF2-40B4-BE49-F238E27FC236}">
-                <a16:creationId xmlns:a16="http://schemas.microsoft.com/office/drawing/2014/main" id="{5BCB1F57-7864-D74F-BAC6-142E875CB92A}"/>
-              </a:ext>
-            </a:extLst>
-          </p:cNvPr>
+            <a:endParaRPr lang="en-US" dirty="0"/>
+          </a:p>
+        </p:txBody>
+      </p:sp>
+      <p:sp>
+        <p:nvSpPr>
+          <p:cNvPr id="3" name="Content Placeholder 2"/>
           <p:cNvSpPr>
             <a:spLocks noGrp="1"/>
           </p:cNvSpPr>
@@ -2696,49 +2426,44 @@
           <a:p>
             <a:pPr lvl="0"/>
             <a:r>
-              <a:rPr lang="en-US"/>
-              <a:t>Edit Master text styles</a:t>
+              <a:rPr lang="en-US" smtClean="0"/>
+              <a:t>Click to edit Master text styles</a:t>
             </a:r>
           </a:p>
           <a:p>
             <a:pPr lvl="1"/>
             <a:r>
-              <a:rPr lang="en-US"/>
+              <a:rPr lang="en-US" smtClean="0"/>
               <a:t>Second level</a:t>
             </a:r>
           </a:p>
           <a:p>
             <a:pPr lvl="2"/>
             <a:r>
-              <a:rPr lang="en-US"/>
+              <a:rPr lang="en-US" smtClean="0"/>
               <a:t>Third level</a:t>
             </a:r>
           </a:p>
           <a:p>
             <a:pPr lvl="3"/>
             <a:r>
-              <a:rPr lang="en-US"/>
+              <a:rPr lang="en-US" smtClean="0"/>
               <a:t>Fourth level</a:t>
             </a:r>
           </a:p>
           <a:p>
             <a:pPr lvl="4"/>
             <a:r>
-              <a:rPr lang="en-US"/>
+              <a:rPr lang="en-US" smtClean="0"/>
               <a:t>Fifth level</a:t>
             </a:r>
-          </a:p>
-        </p:txBody>
-      </p:sp>
-      <p:sp>
-        <p:nvSpPr>
-          <p:cNvPr id="4" name="Text Placeholder 3">
-            <a:extLst>
-              <a:ext uri="{FF2B5EF4-FFF2-40B4-BE49-F238E27FC236}">
-                <a16:creationId xmlns:a16="http://schemas.microsoft.com/office/drawing/2014/main" id="{B60EC2CF-CB50-254A-9C85-EBF3EC03D871}"/>
-              </a:ext>
-            </a:extLst>
-          </p:cNvPr>
+            <a:endParaRPr lang="en-US" dirty="0"/>
+          </a:p>
+        </p:txBody>
+      </p:sp>
+      <p:sp>
+        <p:nvSpPr>
+          <p:cNvPr id="4" name="Text Placeholder 3"/>
           <p:cNvSpPr>
             <a:spLocks noGrp="1"/>
           </p:cNvSpPr>
@@ -2795,21 +2520,15 @@
           <a:p>
             <a:pPr lvl="0"/>
             <a:r>
-              <a:rPr lang="en-US"/>
-              <a:t>Edit Master text styles</a:t>
-            </a:r>
-          </a:p>
-        </p:txBody>
-      </p:sp>
-      <p:sp>
-        <p:nvSpPr>
-          <p:cNvPr id="5" name="Date Placeholder 4">
-            <a:extLst>
-              <a:ext uri="{FF2B5EF4-FFF2-40B4-BE49-F238E27FC236}">
-                <a16:creationId xmlns:a16="http://schemas.microsoft.com/office/drawing/2014/main" id="{A107EA59-F95C-664B-8230-C4DDA8A47A09}"/>
-              </a:ext>
-            </a:extLst>
-          </p:cNvPr>
+              <a:rPr lang="en-US" smtClean="0"/>
+              <a:t>Click to edit Master text styles</a:t>
+            </a:r>
+          </a:p>
+        </p:txBody>
+      </p:sp>
+      <p:sp>
+        <p:nvSpPr>
+          <p:cNvPr id="5" name="Date Placeholder 4"/>
           <p:cNvSpPr>
             <a:spLocks noGrp="1"/>
           </p:cNvSpPr>
@@ -2832,13 +2551,7 @@
       </p:sp>
       <p:sp>
         <p:nvSpPr>
-          <p:cNvPr id="6" name="Footer Placeholder 5">
-            <a:extLst>
-              <a:ext uri="{FF2B5EF4-FFF2-40B4-BE49-F238E27FC236}">
-                <a16:creationId xmlns:a16="http://schemas.microsoft.com/office/drawing/2014/main" id="{040C880F-B0F8-704D-9646-BB911D6480E6}"/>
-              </a:ext>
-            </a:extLst>
-          </p:cNvPr>
+          <p:cNvPr id="6" name="Footer Placeholder 5"/>
           <p:cNvSpPr>
             <a:spLocks noGrp="1"/>
           </p:cNvSpPr>
@@ -2857,13 +2570,7 @@
       </p:sp>
       <p:sp>
         <p:nvSpPr>
-          <p:cNvPr id="7" name="Slide Number Placeholder 6">
-            <a:extLst>
-              <a:ext uri="{FF2B5EF4-FFF2-40B4-BE49-F238E27FC236}">
-                <a16:creationId xmlns:a16="http://schemas.microsoft.com/office/drawing/2014/main" id="{48CCAA6F-CE4D-114C-A3E8-393E93190E98}"/>
-              </a:ext>
-            </a:extLst>
-          </p:cNvPr>
+          <p:cNvPr id="7" name="Slide Number Placeholder 6"/>
           <p:cNvSpPr>
             <a:spLocks noGrp="1"/>
           </p:cNvSpPr>
@@ -2887,7 +2594,7 @@
     </p:spTree>
     <p:extLst>
       <p:ext uri="{BB962C8B-B14F-4D97-AF65-F5344CB8AC3E}">
-        <p14:creationId xmlns:p14="http://schemas.microsoft.com/office/powerpoint/2010/main" val="805616677"/>
+        <p14:creationId xmlns:p14="http://schemas.microsoft.com/office/powerpoint/2010/main" val="179334446"/>
       </p:ext>
     </p:extLst>
   </p:cSld>
@@ -2916,13 +2623,7 @@
       </p:grpSpPr>
       <p:sp>
         <p:nvSpPr>
-          <p:cNvPr id="2" name="Title 1">
-            <a:extLst>
-              <a:ext uri="{FF2B5EF4-FFF2-40B4-BE49-F238E27FC236}">
-                <a16:creationId xmlns:a16="http://schemas.microsoft.com/office/drawing/2014/main" id="{63D2C047-AA61-7B4E-B861-BC6EFEE83BB6}"/>
-              </a:ext>
-            </a:extLst>
-          </p:cNvPr>
+          <p:cNvPr id="2" name="Title 1"/>
           <p:cNvSpPr>
             <a:spLocks noGrp="1"/>
           </p:cNvSpPr>
@@ -2945,23 +2646,18 @@
           </a:lstStyle>
           <a:p>
             <a:r>
-              <a:rPr lang="en-US"/>
+              <a:rPr lang="en-US" smtClean="0"/>
               <a:t>Click to edit Master title style</a:t>
             </a:r>
-          </a:p>
-        </p:txBody>
-      </p:sp>
-      <p:sp>
-        <p:nvSpPr>
-          <p:cNvPr id="3" name="Picture Placeholder 2">
-            <a:extLst>
-              <a:ext uri="{FF2B5EF4-FFF2-40B4-BE49-F238E27FC236}">
-                <a16:creationId xmlns:a16="http://schemas.microsoft.com/office/drawing/2014/main" id="{440957D5-249D-974E-ADE6-8D701C5BCE0C}"/>
-              </a:ext>
-            </a:extLst>
-          </p:cNvPr>
-          <p:cNvSpPr>
-            <a:spLocks noGrp="1"/>
+            <a:endParaRPr lang="en-US" dirty="0"/>
+          </a:p>
+        </p:txBody>
+      </p:sp>
+      <p:sp>
+        <p:nvSpPr>
+          <p:cNvPr id="3" name="Picture Placeholder 2"/>
+          <p:cNvSpPr>
+            <a:spLocks noGrp="1" noChangeAspect="1"/>
           </p:cNvSpPr>
           <p:nvPr>
             <p:ph type="pic" idx="1"/>
@@ -2974,7 +2670,7 @@
           </a:xfrm>
         </p:spPr>
         <p:txBody>
-          <a:bodyPr/>
+          <a:bodyPr anchor="t"/>
           <a:lstStyle>
             <a:lvl1pPr marL="0" indent="0">
               <a:buNone/>
@@ -3014,19 +2710,17 @@
             </a:lvl9pPr>
           </a:lstStyle>
           <a:p>
-            <a:endParaRPr lang="en-US"/>
-          </a:p>
-        </p:txBody>
-      </p:sp>
-      <p:sp>
-        <p:nvSpPr>
-          <p:cNvPr id="4" name="Text Placeholder 3">
-            <a:extLst>
-              <a:ext uri="{FF2B5EF4-FFF2-40B4-BE49-F238E27FC236}">
-                <a16:creationId xmlns:a16="http://schemas.microsoft.com/office/drawing/2014/main" id="{191EE107-0216-384C-A188-59693CD8B0E4}"/>
-              </a:ext>
-            </a:extLst>
-          </p:cNvPr>
+            <a:r>
+              <a:rPr lang="en-US" smtClean="0"/>
+              <a:t>Drag picture to placeholder or click icon to add</a:t>
+            </a:r>
+            <a:endParaRPr lang="en-US" dirty="0"/>
+          </a:p>
+        </p:txBody>
+      </p:sp>
+      <p:sp>
+        <p:nvSpPr>
+          <p:cNvPr id="4" name="Text Placeholder 3"/>
           <p:cNvSpPr>
             <a:spLocks noGrp="1"/>
           </p:cNvSpPr>
@@ -3083,21 +2777,15 @@
           <a:p>
             <a:pPr lvl="0"/>
             <a:r>
-              <a:rPr lang="en-US"/>
-              <a:t>Edit Master text styles</a:t>
-            </a:r>
-          </a:p>
-        </p:txBody>
-      </p:sp>
-      <p:sp>
-        <p:nvSpPr>
-          <p:cNvPr id="5" name="Date Placeholder 4">
-            <a:extLst>
-              <a:ext uri="{FF2B5EF4-FFF2-40B4-BE49-F238E27FC236}">
-                <a16:creationId xmlns:a16="http://schemas.microsoft.com/office/drawing/2014/main" id="{2CC8612D-0201-DA40-9ED1-AB17F1B19139}"/>
-              </a:ext>
-            </a:extLst>
-          </p:cNvPr>
+              <a:rPr lang="en-US" smtClean="0"/>
+              <a:t>Click to edit Master text styles</a:t>
+            </a:r>
+          </a:p>
+        </p:txBody>
+      </p:sp>
+      <p:sp>
+        <p:nvSpPr>
+          <p:cNvPr id="5" name="Date Placeholder 4"/>
           <p:cNvSpPr>
             <a:spLocks noGrp="1"/>
           </p:cNvSpPr>
@@ -3120,13 +2808,7 @@
       </p:sp>
       <p:sp>
         <p:nvSpPr>
-          <p:cNvPr id="6" name="Footer Placeholder 5">
-            <a:extLst>
-              <a:ext uri="{FF2B5EF4-FFF2-40B4-BE49-F238E27FC236}">
-                <a16:creationId xmlns:a16="http://schemas.microsoft.com/office/drawing/2014/main" id="{4D1749FE-A6C8-714C-90AA-AFD40A7E726E}"/>
-              </a:ext>
-            </a:extLst>
-          </p:cNvPr>
+          <p:cNvPr id="6" name="Footer Placeholder 5"/>
           <p:cNvSpPr>
             <a:spLocks noGrp="1"/>
           </p:cNvSpPr>
@@ -3145,13 +2827,7 @@
       </p:sp>
       <p:sp>
         <p:nvSpPr>
-          <p:cNvPr id="7" name="Slide Number Placeholder 6">
-            <a:extLst>
-              <a:ext uri="{FF2B5EF4-FFF2-40B4-BE49-F238E27FC236}">
-                <a16:creationId xmlns:a16="http://schemas.microsoft.com/office/drawing/2014/main" id="{C4B9F94A-281E-8C46-ACE9-86C3FEA16796}"/>
-              </a:ext>
-            </a:extLst>
-          </p:cNvPr>
+          <p:cNvPr id="7" name="Slide Number Placeholder 6"/>
           <p:cNvSpPr>
             <a:spLocks noGrp="1"/>
           </p:cNvSpPr>
@@ -3175,7 +2851,7 @@
     </p:spTree>
     <p:extLst>
       <p:ext uri="{BB962C8B-B14F-4D97-AF65-F5344CB8AC3E}">
-        <p14:creationId xmlns:p14="http://schemas.microsoft.com/office/powerpoint/2010/main" val="4142573501"/>
+        <p14:creationId xmlns:p14="http://schemas.microsoft.com/office/powerpoint/2010/main" val="1154477181"/>
       </p:ext>
     </p:extLst>
   </p:cSld>
@@ -3209,13 +2885,7 @@
       </p:grpSpPr>
       <p:sp>
         <p:nvSpPr>
-          <p:cNvPr id="2" name="Title Placeholder 1">
-            <a:extLst>
-              <a:ext uri="{FF2B5EF4-FFF2-40B4-BE49-F238E27FC236}">
-                <a16:creationId xmlns:a16="http://schemas.microsoft.com/office/drawing/2014/main" id="{17A4EEC9-8F0C-6843-8B04-041C192C88CA}"/>
-              </a:ext>
-            </a:extLst>
-          </p:cNvPr>
+          <p:cNvPr id="2" name="Title Placeholder 1"/>
           <p:cNvSpPr>
             <a:spLocks noGrp="1"/>
           </p:cNvSpPr>
@@ -3239,21 +2909,16 @@
           <a:lstStyle/>
           <a:p>
             <a:r>
-              <a:rPr lang="en-US"/>
+              <a:rPr lang="en-US" smtClean="0"/>
               <a:t>Click to edit Master title style</a:t>
             </a:r>
-          </a:p>
-        </p:txBody>
-      </p:sp>
-      <p:sp>
-        <p:nvSpPr>
-          <p:cNvPr id="3" name="Text Placeholder 2">
-            <a:extLst>
-              <a:ext uri="{FF2B5EF4-FFF2-40B4-BE49-F238E27FC236}">
-                <a16:creationId xmlns:a16="http://schemas.microsoft.com/office/drawing/2014/main" id="{92CB5A05-8DFD-A049-AEB3-FEF489DD6D65}"/>
-              </a:ext>
-            </a:extLst>
-          </p:cNvPr>
+            <a:endParaRPr lang="en-US" dirty="0"/>
+          </a:p>
+        </p:txBody>
+      </p:sp>
+      <p:sp>
+        <p:nvSpPr>
+          <p:cNvPr id="3" name="Text Placeholder 2"/>
           <p:cNvSpPr>
             <a:spLocks noGrp="1"/>
           </p:cNvSpPr>
@@ -3278,49 +2943,44 @@
           <a:p>
             <a:pPr lvl="0"/>
             <a:r>
-              <a:rPr lang="en-US"/>
-              <a:t>Edit Master text styles</a:t>
+              <a:rPr lang="en-US" smtClean="0"/>
+              <a:t>Click to edit Master text styles</a:t>
             </a:r>
           </a:p>
           <a:p>
             <a:pPr lvl="1"/>
             <a:r>
-              <a:rPr lang="en-US"/>
+              <a:rPr lang="en-US" smtClean="0"/>
               <a:t>Second level</a:t>
             </a:r>
           </a:p>
           <a:p>
             <a:pPr lvl="2"/>
             <a:r>
-              <a:rPr lang="en-US"/>
+              <a:rPr lang="en-US" smtClean="0"/>
               <a:t>Third level</a:t>
             </a:r>
           </a:p>
           <a:p>
             <a:pPr lvl="3"/>
             <a:r>
-              <a:rPr lang="en-US"/>
+              <a:rPr lang="en-US" smtClean="0"/>
               <a:t>Fourth level</a:t>
             </a:r>
           </a:p>
           <a:p>
             <a:pPr lvl="4"/>
             <a:r>
-              <a:rPr lang="en-US"/>
+              <a:rPr lang="en-US" smtClean="0"/>
               <a:t>Fifth level</a:t>
             </a:r>
-          </a:p>
-        </p:txBody>
-      </p:sp>
-      <p:sp>
-        <p:nvSpPr>
-          <p:cNvPr id="4" name="Date Placeholder 3">
-            <a:extLst>
-              <a:ext uri="{FF2B5EF4-FFF2-40B4-BE49-F238E27FC236}">
-                <a16:creationId xmlns:a16="http://schemas.microsoft.com/office/drawing/2014/main" id="{2519D28D-C973-6C4A-8A26-276476889D9F}"/>
-              </a:ext>
-            </a:extLst>
-          </p:cNvPr>
+            <a:endParaRPr lang="en-US" dirty="0"/>
+          </a:p>
+        </p:txBody>
+      </p:sp>
+      <p:sp>
+        <p:nvSpPr>
+          <p:cNvPr id="4" name="Date Placeholder 3"/>
           <p:cNvSpPr>
             <a:spLocks noGrp="1"/>
           </p:cNvSpPr>
@@ -3361,13 +3021,7 @@
       </p:sp>
       <p:sp>
         <p:nvSpPr>
-          <p:cNvPr id="5" name="Footer Placeholder 4">
-            <a:extLst>
-              <a:ext uri="{FF2B5EF4-FFF2-40B4-BE49-F238E27FC236}">
-                <a16:creationId xmlns:a16="http://schemas.microsoft.com/office/drawing/2014/main" id="{CFC0F4EE-CF85-A74D-90AB-7A7249C74BA0}"/>
-              </a:ext>
-            </a:extLst>
-          </p:cNvPr>
+          <p:cNvPr id="5" name="Footer Placeholder 4"/>
           <p:cNvSpPr>
             <a:spLocks noGrp="1"/>
           </p:cNvSpPr>
@@ -3404,13 +3058,7 @@
       </p:sp>
       <p:sp>
         <p:nvSpPr>
-          <p:cNvPr id="6" name="Slide Number Placeholder 5">
-            <a:extLst>
-              <a:ext uri="{FF2B5EF4-FFF2-40B4-BE49-F238E27FC236}">
-                <a16:creationId xmlns:a16="http://schemas.microsoft.com/office/drawing/2014/main" id="{439CF523-A35D-DB4A-9634-A5E344211336}"/>
-              </a:ext>
-            </a:extLst>
-          </p:cNvPr>
+          <p:cNvPr id="6" name="Slide Number Placeholder 5"/>
           <p:cNvSpPr>
             <a:spLocks noGrp="1"/>
           </p:cNvSpPr>
@@ -3452,23 +3100,23 @@
     </p:spTree>
     <p:extLst>
       <p:ext uri="{BB962C8B-B14F-4D97-AF65-F5344CB8AC3E}">
-        <p14:creationId xmlns:p14="http://schemas.microsoft.com/office/powerpoint/2010/main" val="311568859"/>
+        <p14:creationId xmlns:p14="http://schemas.microsoft.com/office/powerpoint/2010/main" val="563890838"/>
       </p:ext>
     </p:extLst>
   </p:cSld>
   <p:clrMap bg1="lt1" tx1="dk1" bg2="lt2" tx2="dk2" accent1="accent1" accent2="accent2" accent3="accent3" accent4="accent4" accent5="accent5" accent6="accent6" hlink="hlink" folHlink="folHlink"/>
   <p:sldLayoutIdLst>
-    <p:sldLayoutId id="2147483649" r:id="rId1"/>
-    <p:sldLayoutId id="2147483650" r:id="rId2"/>
-    <p:sldLayoutId id="2147483651" r:id="rId3"/>
-    <p:sldLayoutId id="2147483652" r:id="rId4"/>
-    <p:sldLayoutId id="2147483653" r:id="rId5"/>
-    <p:sldLayoutId id="2147483654" r:id="rId6"/>
-    <p:sldLayoutId id="2147483655" r:id="rId7"/>
-    <p:sldLayoutId id="2147483656" r:id="rId8"/>
-    <p:sldLayoutId id="2147483657" r:id="rId9"/>
-    <p:sldLayoutId id="2147483658" r:id="rId10"/>
-    <p:sldLayoutId id="2147483659" r:id="rId11"/>
+    <p:sldLayoutId id="2147483661" r:id="rId1"/>
+    <p:sldLayoutId id="2147483662" r:id="rId2"/>
+    <p:sldLayoutId id="2147483663" r:id="rId3"/>
+    <p:sldLayoutId id="2147483664" r:id="rId4"/>
+    <p:sldLayoutId id="2147483665" r:id="rId5"/>
+    <p:sldLayoutId id="2147483666" r:id="rId6"/>
+    <p:sldLayoutId id="2147483667" r:id="rId7"/>
+    <p:sldLayoutId id="2147483668" r:id="rId8"/>
+    <p:sldLayoutId id="2147483669" r:id="rId9"/>
+    <p:sldLayoutId id="2147483670" r:id="rId10"/>
+    <p:sldLayoutId id="2147483671" r:id="rId11"/>
   </p:sldLayoutIdLst>
   <p:txStyles>
     <p:titleStyle>
@@ -3783,10 +3431,10 @@
           <p:cNvPr id="10" name="Rectangle 9">
             <a:extLst>
               <a:ext uri="{FF2B5EF4-FFF2-40B4-BE49-F238E27FC236}">
-                <a16:creationId xmlns:a16="http://schemas.microsoft.com/office/drawing/2014/main" id="{C0B27210-D0CA-4654-B3E3-9ABB4F178EA1}"/>
+                <a16:creationId xmlns:a16="http://schemas.microsoft.com/office/drawing/2014/main" xmlns="" id="{C0B27210-D0CA-4654-B3E3-9ABB4F178EA1}"/>
               </a:ext>
               <a:ext uri="{C183D7F6-B498-43B3-948B-1728B52AA6E4}">
-                <adec:decorative xmlns:adec="http://schemas.microsoft.com/office/drawing/2017/decorative" val="1"/>
+                <adec:decorative xmlns:adec="http://schemas.microsoft.com/office/drawing/2017/decorative" xmlns="" val="1"/>
               </a:ext>
             </a:extLst>
           </p:cNvPr>
@@ -3794,11 +3442,7 @@
             <a:spLocks noGrp="1" noRot="1" noChangeAspect="1" noMove="1" noResize="1" noEditPoints="1" noAdjustHandles="1" noChangeArrowheads="1" noChangeShapeType="1" noTextEdit="1"/>
           </p:cNvSpPr>
           <p:nvPr>
-            <p:extLst>
-              <p:ext uri="{386F3935-93C4-4BCD-93E2-E3B085C9AB24}">
-                <p16:designElem xmlns:p16="http://schemas.microsoft.com/office/powerpoint/2015/main" val="1"/>
-              </p:ext>
-            </p:extLst>
+            <p:extLst/>
           </p:nvPr>
         </p:nvSpPr>
         <p:spPr>
@@ -3849,7 +3493,7 @@
           <p:cNvPr id="2" name="Title 1">
             <a:extLst>
               <a:ext uri="{FF2B5EF4-FFF2-40B4-BE49-F238E27FC236}">
-                <a16:creationId xmlns:a16="http://schemas.microsoft.com/office/drawing/2014/main" id="{DCE11122-6789-3847-8061-EDF24F34738A}"/>
+                <a16:creationId xmlns:a16="http://schemas.microsoft.com/office/drawing/2014/main" xmlns="" id="{DCE11122-6789-3847-8061-EDF24F34738A}"/>
               </a:ext>
             </a:extLst>
           </p:cNvPr>
@@ -3887,6 +3531,14 @@
                 </a:solidFill>
               </a:rPr>
             </a:br>
+            <a:r>
+              <a:rPr lang="en-US" dirty="0">
+                <a:solidFill>
+                  <a:schemeClr val="bg1"/>
+                </a:solidFill>
+              </a:rPr>
+              <a:t/>
+            </a:r>
             <a:br>
               <a:rPr lang="en-US" dirty="0">
                 <a:solidFill>
@@ -3923,10 +3575,10 @@
           <p:cNvPr id="12" name="Freeform: Shape 11">
             <a:extLst>
               <a:ext uri="{FF2B5EF4-FFF2-40B4-BE49-F238E27FC236}">
-                <a16:creationId xmlns:a16="http://schemas.microsoft.com/office/drawing/2014/main" id="{1DB7C82F-AB7E-4F0C-B829-FA1B9C415180}"/>
+                <a16:creationId xmlns:a16="http://schemas.microsoft.com/office/drawing/2014/main" xmlns="" id="{1DB7C82F-AB7E-4F0C-B829-FA1B9C415180}"/>
               </a:ext>
               <a:ext uri="{C183D7F6-B498-43B3-948B-1728B52AA6E4}">
-                <adec:decorative xmlns:adec="http://schemas.microsoft.com/office/drawing/2017/decorative" val="1"/>
+                <adec:decorative xmlns:adec="http://schemas.microsoft.com/office/drawing/2017/decorative" xmlns="" val="1"/>
               </a:ext>
             </a:extLst>
           </p:cNvPr>
@@ -3934,11 +3586,7 @@
             <a:spLocks noGrp="1" noRot="1" noChangeAspect="1" noMove="1" noResize="1" noEditPoints="1" noAdjustHandles="1" noChangeArrowheads="1" noChangeShapeType="1" noTextEdit="1"/>
           </p:cNvSpPr>
           <p:nvPr>
-            <p:extLst>
-              <p:ext uri="{386F3935-93C4-4BCD-93E2-E3B085C9AB24}">
-                <p16:designElem xmlns:p16="http://schemas.microsoft.com/office/powerpoint/2015/main" val="1"/>
-              </p:ext>
-            </p:extLst>
+            <p:extLst/>
           </p:nvPr>
         </p:nvSpPr>
         <p:spPr>
@@ -4090,10 +3738,10 @@
           <p:cNvPr id="14" name="Freeform: Shape 13">
             <a:extLst>
               <a:ext uri="{FF2B5EF4-FFF2-40B4-BE49-F238E27FC236}">
-                <a16:creationId xmlns:a16="http://schemas.microsoft.com/office/drawing/2014/main" id="{70B66945-4967-4040-926D-DCA44313CDAB}"/>
+                <a16:creationId xmlns:a16="http://schemas.microsoft.com/office/drawing/2014/main" xmlns="" id="{70B66945-4967-4040-926D-DCA44313CDAB}"/>
               </a:ext>
               <a:ext uri="{C183D7F6-B498-43B3-948B-1728B52AA6E4}">
-                <adec:decorative xmlns:adec="http://schemas.microsoft.com/office/drawing/2017/decorative" val="1"/>
+                <adec:decorative xmlns:adec="http://schemas.microsoft.com/office/drawing/2017/decorative" xmlns="" val="1"/>
               </a:ext>
             </a:extLst>
           </p:cNvPr>
@@ -4101,11 +3749,7 @@
             <a:spLocks noGrp="1" noRot="1" noChangeAspect="1" noMove="1" noResize="1" noEditPoints="1" noAdjustHandles="1" noChangeArrowheads="1" noChangeShapeType="1" noTextEdit="1"/>
           </p:cNvSpPr>
           <p:nvPr>
-            <p:extLst>
-              <p:ext uri="{386F3935-93C4-4BCD-93E2-E3B085C9AB24}">
-                <p16:designElem xmlns:p16="http://schemas.microsoft.com/office/powerpoint/2015/main" val="1"/>
-              </p:ext>
-            </p:extLst>
+            <p:extLst/>
           </p:nvPr>
         </p:nvSpPr>
         <p:spPr>
@@ -4255,7 +3899,7 @@
           <p:cNvPr id="5" name="Picture 4">
             <a:extLst>
               <a:ext uri="{FF2B5EF4-FFF2-40B4-BE49-F238E27FC236}">
-                <a16:creationId xmlns:a16="http://schemas.microsoft.com/office/drawing/2014/main" id="{3C0F58C2-1619-0B4A-A30E-1401050B2EFC}"/>
+                <a16:creationId xmlns:a16="http://schemas.microsoft.com/office/drawing/2014/main" xmlns="" id="{3C0F58C2-1619-0B4A-A30E-1401050B2EFC}"/>
               </a:ext>
             </a:extLst>
           </p:cNvPr>
@@ -4293,6 +3937,90 @@
 </p:sld>
 </file>
 
+<file path=ppt/slides/slide10.xml><?xml version="1.0" encoding="utf-8"?>
+<p:sld xmlns:a="http://schemas.openxmlformats.org/drawingml/2006/main" xmlns:r="http://schemas.openxmlformats.org/officeDocument/2006/relationships" xmlns:p="http://schemas.openxmlformats.org/presentationml/2006/main">
+  <p:cSld>
+    <p:spTree>
+      <p:nvGrpSpPr>
+        <p:cNvPr id="1" name=""/>
+        <p:cNvGrpSpPr/>
+        <p:nvPr/>
+      </p:nvGrpSpPr>
+      <p:grpSpPr>
+        <a:xfrm>
+          <a:off x="0" y="0"/>
+          <a:ext cx="0" cy="0"/>
+          <a:chOff x="0" y="0"/>
+          <a:chExt cx="0" cy="0"/>
+        </a:xfrm>
+      </p:grpSpPr>
+      <p:sp>
+        <p:nvSpPr>
+          <p:cNvPr id="3" name="Content Placeholder 2"/>
+          <p:cNvSpPr>
+            <a:spLocks noGrp="1"/>
+          </p:cNvSpPr>
+          <p:nvPr>
+            <p:ph idx="1"/>
+          </p:nvPr>
+        </p:nvSpPr>
+        <p:spPr>
+          <a:xfrm>
+            <a:off x="374073" y="1825625"/>
+            <a:ext cx="10979727" cy="1042266"/>
+          </a:xfrm>
+        </p:spPr>
+        <p:txBody>
+          <a:bodyPr>
+            <a:normAutofit/>
+          </a:bodyPr>
+          <a:lstStyle/>
+          <a:p>
+            <a:pPr marL="0" lvl="0" indent="0">
+              <a:lnSpc>
+                <a:spcPct val="100000"/>
+              </a:lnSpc>
+              <a:spcBef>
+                <a:spcPts val="0"/>
+              </a:spcBef>
+              <a:buNone/>
+            </a:pPr>
+            <a:r>
+              <a:rPr lang="en-US" sz="4400" dirty="0"/>
+              <a:t>https://</a:t>
+            </a:r>
+            <a:r>
+              <a:rPr lang="en-US" sz="4400" dirty="0" err="1"/>
+              <a:t>github.com</a:t>
+            </a:r>
+            <a:r>
+              <a:rPr lang="en-US" sz="4400" dirty="0"/>
+              <a:t>/</a:t>
+            </a:r>
+            <a:r>
+              <a:rPr lang="en-US" sz="4400" dirty="0" err="1"/>
+              <a:t>nautoguide</a:t>
+            </a:r>
+            <a:r>
+              <a:rPr lang="en-US" sz="4400" dirty="0"/>
+              <a:t>/presentations</a:t>
+            </a:r>
+          </a:p>
+        </p:txBody>
+      </p:sp>
+    </p:spTree>
+    <p:extLst>
+      <p:ext uri="{BB962C8B-B14F-4D97-AF65-F5344CB8AC3E}">
+        <p14:creationId xmlns:p14="http://schemas.microsoft.com/office/powerpoint/2010/main" val="1431674258"/>
+      </p:ext>
+    </p:extLst>
+  </p:cSld>
+  <p:clrMapOvr>
+    <a:masterClrMapping/>
+  </p:clrMapOvr>
+</p:sld>
+</file>
+
 <file path=ppt/slides/slide2.xml><?xml version="1.0" encoding="utf-8"?>
 <p:sld xmlns:a="http://schemas.openxmlformats.org/drawingml/2006/main" xmlns:r="http://schemas.openxmlformats.org/officeDocument/2006/relationships" xmlns:p="http://schemas.openxmlformats.org/presentationml/2006/main">
   <p:cSld>
@@ -4326,7 +4054,7 @@
           <p:cNvPr id="2" name="Title 1">
             <a:extLst>
               <a:ext uri="{FF2B5EF4-FFF2-40B4-BE49-F238E27FC236}">
-                <a16:creationId xmlns:a16="http://schemas.microsoft.com/office/drawing/2014/main" id="{DC9F3F41-3ABE-4241-A527-957E40465DD7}"/>
+                <a16:creationId xmlns:a16="http://schemas.microsoft.com/office/drawing/2014/main" xmlns="" id="{DC9F3F41-3ABE-4241-A527-957E40465DD7}"/>
               </a:ext>
             </a:extLst>
           </p:cNvPr>
@@ -4361,10 +4089,10 @@
           <p:cNvPr id="10" name="Freeform: Shape 9">
             <a:extLst>
               <a:ext uri="{FF2B5EF4-FFF2-40B4-BE49-F238E27FC236}">
-                <a16:creationId xmlns:a16="http://schemas.microsoft.com/office/drawing/2014/main" id="{1DB7C82F-AB7E-4F0C-B829-FA1B9C415180}"/>
+                <a16:creationId xmlns:a16="http://schemas.microsoft.com/office/drawing/2014/main" xmlns="" id="{1DB7C82F-AB7E-4F0C-B829-FA1B9C415180}"/>
               </a:ext>
               <a:ext uri="{C183D7F6-B498-43B3-948B-1728B52AA6E4}">
-                <adec:decorative xmlns:adec="http://schemas.microsoft.com/office/drawing/2017/decorative" val="1"/>
+                <adec:decorative xmlns:adec="http://schemas.microsoft.com/office/drawing/2017/decorative" xmlns="" val="1"/>
               </a:ext>
             </a:extLst>
           </p:cNvPr>
@@ -4372,11 +4100,7 @@
             <a:spLocks noGrp="1" noRot="1" noChangeAspect="1" noMove="1" noResize="1" noEditPoints="1" noAdjustHandles="1" noChangeArrowheads="1" noChangeShapeType="1" noTextEdit="1"/>
           </p:cNvSpPr>
           <p:nvPr>
-            <p:extLst>
-              <p:ext uri="{386F3935-93C4-4BCD-93E2-E3B085C9AB24}">
-                <p16:designElem xmlns:p16="http://schemas.microsoft.com/office/powerpoint/2015/main" val="1"/>
-              </p:ext>
-            </p:extLst>
+            <p:extLst/>
           </p:nvPr>
         </p:nvSpPr>
         <p:spPr>
@@ -4528,7 +4252,7 @@
           <p:cNvPr id="5" name="Picture 4">
             <a:extLst>
               <a:ext uri="{FF2B5EF4-FFF2-40B4-BE49-F238E27FC236}">
-                <a16:creationId xmlns:a16="http://schemas.microsoft.com/office/drawing/2014/main" id="{C6C52A39-5126-154A-B302-65A8C894BF5A}"/>
+                <a16:creationId xmlns:a16="http://schemas.microsoft.com/office/drawing/2014/main" xmlns="" id="{C6C52A39-5126-154A-B302-65A8C894BF5A}"/>
               </a:ext>
             </a:extLst>
           </p:cNvPr>
@@ -4629,7 +4353,7 @@
             <a:hlinkClick r:id="rId3"/>
             <a:extLst>
               <a:ext uri="{FF2B5EF4-FFF2-40B4-BE49-F238E27FC236}">
-                <a16:creationId xmlns:a16="http://schemas.microsoft.com/office/drawing/2014/main" id="{68A1C85F-60CD-C943-A16A-905BAE3698B0}"/>
+                <a16:creationId xmlns:a16="http://schemas.microsoft.com/office/drawing/2014/main" xmlns="" id="{68A1C85F-60CD-C943-A16A-905BAE3698B0}"/>
               </a:ext>
             </a:extLst>
           </p:cNvPr>
@@ -4642,7 +4366,7 @@
           <a:blip r:embed="rId4">
             <a:extLst>
               <a:ext uri="{96DAC541-7B7A-43D3-8B79-37D633B846F1}">
-                <asvg:svgBlip xmlns:asvg="http://schemas.microsoft.com/office/drawing/2016/SVG/main" r:embed="rId5"/>
+                <asvg:svgBlip xmlns:asvg="http://schemas.microsoft.com/office/drawing/2016/SVG/main" xmlns="" r:embed="rId5"/>
               </a:ext>
             </a:extLst>
           </a:blip>
@@ -4706,10 +4430,10 @@
           <p:cNvPr id="16" name="Rectangle 12">
             <a:extLst>
               <a:ext uri="{FF2B5EF4-FFF2-40B4-BE49-F238E27FC236}">
-                <a16:creationId xmlns:a16="http://schemas.microsoft.com/office/drawing/2014/main" id="{5B32A67F-3598-4A13-8552-DA884FFCCE57}"/>
+                <a16:creationId xmlns:a16="http://schemas.microsoft.com/office/drawing/2014/main" xmlns="" id="{5B32A67F-3598-4A13-8552-DA884FFCCE57}"/>
               </a:ext>
               <a:ext uri="{C183D7F6-B498-43B3-948B-1728B52AA6E4}">
-                <adec:decorative xmlns:adec="http://schemas.microsoft.com/office/drawing/2017/decorative" val="1"/>
+                <adec:decorative xmlns:adec="http://schemas.microsoft.com/office/drawing/2017/decorative" xmlns="" val="1"/>
               </a:ext>
             </a:extLst>
           </p:cNvPr>
@@ -4717,11 +4441,7 @@
             <a:spLocks noGrp="1" noRot="1" noChangeAspect="1" noMove="1" noResize="1" noEditPoints="1" noAdjustHandles="1" noChangeArrowheads="1" noChangeShapeType="1" noTextEdit="1"/>
           </p:cNvSpPr>
           <p:nvPr>
-            <p:extLst>
-              <p:ext uri="{386F3935-93C4-4BCD-93E2-E3B085C9AB24}">
-                <p16:designElem xmlns:p16="http://schemas.microsoft.com/office/powerpoint/2015/main" val="1"/>
-              </p:ext>
-            </p:extLst>
+            <p:extLst/>
           </p:nvPr>
         </p:nvSpPr>
         <p:spPr>
@@ -4772,7 +4492,7 @@
           <p:cNvPr id="2" name="Title 1">
             <a:extLst>
               <a:ext uri="{FF2B5EF4-FFF2-40B4-BE49-F238E27FC236}">
-                <a16:creationId xmlns:a16="http://schemas.microsoft.com/office/drawing/2014/main" id="{6C21AF0D-86B1-8D47-8015-FDA6D654ED53}"/>
+                <a16:creationId xmlns:a16="http://schemas.microsoft.com/office/drawing/2014/main" xmlns="" id="{6C21AF0D-86B1-8D47-8015-FDA6D654ED53}"/>
               </a:ext>
             </a:extLst>
           </p:cNvPr>
@@ -4825,10 +4545,10 @@
           <p:cNvPr id="15" name="Freeform: Shape 14">
             <a:extLst>
               <a:ext uri="{FF2B5EF4-FFF2-40B4-BE49-F238E27FC236}">
-                <a16:creationId xmlns:a16="http://schemas.microsoft.com/office/drawing/2014/main" id="{BCC55ACC-A2F6-403C-A3A4-D59B3734D45F}"/>
+                <a16:creationId xmlns:a16="http://schemas.microsoft.com/office/drawing/2014/main" xmlns="" id="{BCC55ACC-A2F6-403C-A3A4-D59B3734D45F}"/>
               </a:ext>
               <a:ext uri="{C183D7F6-B498-43B3-948B-1728B52AA6E4}">
-                <adec:decorative xmlns:adec="http://schemas.microsoft.com/office/drawing/2017/decorative" val="1"/>
+                <adec:decorative xmlns:adec="http://schemas.microsoft.com/office/drawing/2017/decorative" xmlns="" val="1"/>
               </a:ext>
             </a:extLst>
           </p:cNvPr>
@@ -4836,11 +4556,7 @@
             <a:spLocks noGrp="1" noRot="1" noChangeAspect="1" noMove="1" noResize="1" noEditPoints="1" noAdjustHandles="1" noChangeArrowheads="1" noChangeShapeType="1" noTextEdit="1"/>
           </p:cNvSpPr>
           <p:nvPr>
-            <p:extLst>
-              <p:ext uri="{386F3935-93C4-4BCD-93E2-E3B085C9AB24}">
-                <p16:designElem xmlns:p16="http://schemas.microsoft.com/office/powerpoint/2015/main" val="1"/>
-              </p:ext>
-            </p:extLst>
+            <p:extLst/>
           </p:nvPr>
         </p:nvSpPr>
         <p:spPr>
@@ -5026,10 +4742,10 @@
           <p:cNvPr id="17" name="Freeform: Shape 16">
             <a:extLst>
               <a:ext uri="{FF2B5EF4-FFF2-40B4-BE49-F238E27FC236}">
-                <a16:creationId xmlns:a16="http://schemas.microsoft.com/office/drawing/2014/main" id="{598EBA13-C937-430B-9523-439FE21096E6}"/>
+                <a16:creationId xmlns:a16="http://schemas.microsoft.com/office/drawing/2014/main" xmlns="" id="{598EBA13-C937-430B-9523-439FE21096E6}"/>
               </a:ext>
               <a:ext uri="{C183D7F6-B498-43B3-948B-1728B52AA6E4}">
-                <adec:decorative xmlns:adec="http://schemas.microsoft.com/office/drawing/2017/decorative" val="1"/>
+                <adec:decorative xmlns:adec="http://schemas.microsoft.com/office/drawing/2017/decorative" xmlns="" val="1"/>
               </a:ext>
             </a:extLst>
           </p:cNvPr>
@@ -5037,11 +4753,7 @@
             <a:spLocks noGrp="1" noRot="1" noChangeAspect="1" noMove="1" noResize="1" noEditPoints="1" noAdjustHandles="1" noChangeArrowheads="1" noChangeShapeType="1" noTextEdit="1"/>
           </p:cNvSpPr>
           <p:nvPr>
-            <p:extLst>
-              <p:ext uri="{386F3935-93C4-4BCD-93E2-E3B085C9AB24}">
-                <p16:designElem xmlns:p16="http://schemas.microsoft.com/office/powerpoint/2015/main" val="1"/>
-              </p:ext>
-            </p:extLst>
+            <p:extLst/>
           </p:nvPr>
         </p:nvSpPr>
         <p:spPr>
@@ -5225,7 +4937,7 @@
           <p:cNvPr id="6" name="Graphic 5" descr="Slippery">
             <a:extLst>
               <a:ext uri="{FF2B5EF4-FFF2-40B4-BE49-F238E27FC236}">
-                <a16:creationId xmlns:a16="http://schemas.microsoft.com/office/drawing/2014/main" id="{C57BEF0E-568E-446C-A099-2A12DEDA6C02}"/>
+                <a16:creationId xmlns:a16="http://schemas.microsoft.com/office/drawing/2014/main" xmlns="" id="{C57BEF0E-568E-446C-A099-2A12DEDA6C02}"/>
               </a:ext>
             </a:extLst>
           </p:cNvPr>
@@ -5241,7 +4953,7 @@
                 <a14:useLocalDpi xmlns:a14="http://schemas.microsoft.com/office/drawing/2010/main" val="0"/>
               </a:ext>
               <a:ext uri="{96DAC541-7B7A-43D3-8B79-37D633B846F1}">
-                <asvg:svgBlip xmlns:asvg="http://schemas.microsoft.com/office/drawing/2016/SVG/main" r:embed="rId3"/>
+                <asvg:svgBlip xmlns:asvg="http://schemas.microsoft.com/office/drawing/2016/SVG/main" xmlns="" r:embed="rId3"/>
               </a:ext>
             </a:extLst>
           </a:blip>
@@ -5302,10 +5014,10 @@
           <p:cNvPr id="10" name="Rectangle 9">
             <a:extLst>
               <a:ext uri="{FF2B5EF4-FFF2-40B4-BE49-F238E27FC236}">
-                <a16:creationId xmlns:a16="http://schemas.microsoft.com/office/drawing/2014/main" id="{6753252F-4873-4F63-801D-CC719279A7D5}"/>
+                <a16:creationId xmlns:a16="http://schemas.microsoft.com/office/drawing/2014/main" xmlns="" id="{6753252F-4873-4F63-801D-CC719279A7D5}"/>
               </a:ext>
               <a:ext uri="{C183D7F6-B498-43B3-948B-1728B52AA6E4}">
-                <adec:decorative xmlns:adec="http://schemas.microsoft.com/office/drawing/2017/decorative" val="1"/>
+                <adec:decorative xmlns:adec="http://schemas.microsoft.com/office/drawing/2017/decorative" xmlns="" val="1"/>
               </a:ext>
             </a:extLst>
           </p:cNvPr>
@@ -5313,11 +5025,7 @@
             <a:spLocks noGrp="1" noRot="1" noChangeAspect="1" noMove="1" noResize="1" noEditPoints="1" noAdjustHandles="1" noChangeArrowheads="1" noChangeShapeType="1" noTextEdit="1"/>
           </p:cNvSpPr>
           <p:nvPr>
-            <p:extLst>
-              <p:ext uri="{386F3935-93C4-4BCD-93E2-E3B085C9AB24}">
-                <p16:designElem xmlns:p16="http://schemas.microsoft.com/office/powerpoint/2015/main" val="1"/>
-              </p:ext>
-            </p:extLst>
+            <p:extLst/>
           </p:nvPr>
         </p:nvSpPr>
         <p:spPr>
@@ -5365,10 +5073,10 @@
           <p:cNvPr id="12" name="Rectangle 11">
             <a:extLst>
               <a:ext uri="{FF2B5EF4-FFF2-40B4-BE49-F238E27FC236}">
-                <a16:creationId xmlns:a16="http://schemas.microsoft.com/office/drawing/2014/main" id="{047C8CCB-F95D-4249-92DD-651249D3535A}"/>
+                <a16:creationId xmlns:a16="http://schemas.microsoft.com/office/drawing/2014/main" xmlns="" id="{047C8CCB-F95D-4249-92DD-651249D3535A}"/>
               </a:ext>
               <a:ext uri="{C183D7F6-B498-43B3-948B-1728B52AA6E4}">
-                <adec:decorative xmlns:adec="http://schemas.microsoft.com/office/drawing/2017/decorative" val="1"/>
+                <adec:decorative xmlns:adec="http://schemas.microsoft.com/office/drawing/2017/decorative" xmlns="" val="1"/>
               </a:ext>
             </a:extLst>
           </p:cNvPr>
@@ -5376,11 +5084,7 @@
             <a:spLocks noGrp="1" noRot="1" noChangeAspect="1" noMove="1" noResize="1" noEditPoints="1" noAdjustHandles="1" noChangeArrowheads="1" noChangeShapeType="1" noTextEdit="1"/>
           </p:cNvSpPr>
           <p:nvPr>
-            <p:extLst>
-              <p:ext uri="{386F3935-93C4-4BCD-93E2-E3B085C9AB24}">
-                <p16:designElem xmlns:p16="http://schemas.microsoft.com/office/powerpoint/2015/main" val="1"/>
-              </p:ext>
-            </p:extLst>
+            <p:extLst/>
           </p:nvPr>
         </p:nvSpPr>
         <p:spPr>
@@ -5428,7 +5132,7 @@
           <p:cNvPr id="2" name="Title 1">
             <a:extLst>
               <a:ext uri="{FF2B5EF4-FFF2-40B4-BE49-F238E27FC236}">
-                <a16:creationId xmlns:a16="http://schemas.microsoft.com/office/drawing/2014/main" id="{B0E07672-26A2-E241-ACBE-ACD935DB3AE4}"/>
+                <a16:creationId xmlns:a16="http://schemas.microsoft.com/office/drawing/2014/main" xmlns="" id="{B0E07672-26A2-E241-ACBE-ACD935DB3AE4}"/>
               </a:ext>
             </a:extLst>
           </p:cNvPr>
@@ -5482,7 +5186,7 @@
           <p:cNvPr id="5" name="Picture 4">
             <a:extLst>
               <a:ext uri="{FF2B5EF4-FFF2-40B4-BE49-F238E27FC236}">
-                <a16:creationId xmlns:a16="http://schemas.microsoft.com/office/drawing/2014/main" id="{BA7F6777-CD02-5F40-ACF9-9FC46F7E378E}"/>
+                <a16:creationId xmlns:a16="http://schemas.microsoft.com/office/drawing/2014/main" xmlns="" id="{BA7F6777-CD02-5F40-ACF9-9FC46F7E378E}"/>
               </a:ext>
             </a:extLst>
           </p:cNvPr>
@@ -5512,7 +5216,7 @@
           <p:cNvPr id="6" name="TextBox 5">
             <a:extLst>
               <a:ext uri="{FF2B5EF4-FFF2-40B4-BE49-F238E27FC236}">
-                <a16:creationId xmlns:a16="http://schemas.microsoft.com/office/drawing/2014/main" id="{F328DB98-6E21-5142-A97F-A94627DABC80}"/>
+                <a16:creationId xmlns:a16="http://schemas.microsoft.com/office/drawing/2014/main" xmlns="" id="{F328DB98-6E21-5142-A97F-A94627DABC80}"/>
               </a:ext>
             </a:extLst>
           </p:cNvPr>
@@ -5698,7 +5402,7 @@
           <p:cNvPr id="2" name="Title 1">
             <a:extLst>
               <a:ext uri="{FF2B5EF4-FFF2-40B4-BE49-F238E27FC236}">
-                <a16:creationId xmlns:a16="http://schemas.microsoft.com/office/drawing/2014/main" id="{B0E07672-26A2-E241-ACBE-ACD935DB3AE4}"/>
+                <a16:creationId xmlns:a16="http://schemas.microsoft.com/office/drawing/2014/main" xmlns="" id="{B0E07672-26A2-E241-ACBE-ACD935DB3AE4}"/>
               </a:ext>
             </a:extLst>
           </p:cNvPr>
@@ -5752,7 +5456,7 @@
           <p:cNvPr id="6" name="TextBox 5">
             <a:extLst>
               <a:ext uri="{FF2B5EF4-FFF2-40B4-BE49-F238E27FC236}">
-                <a16:creationId xmlns:a16="http://schemas.microsoft.com/office/drawing/2014/main" id="{F328DB98-6E21-5142-A97F-A94627DABC80}"/>
+                <a16:creationId xmlns:a16="http://schemas.microsoft.com/office/drawing/2014/main" xmlns="" id="{F328DB98-6E21-5142-A97F-A94627DABC80}"/>
               </a:ext>
             </a:extLst>
           </p:cNvPr>
@@ -5793,7 +5497,7 @@
           <p:cNvPr id="4" name="Picture 3">
             <a:extLst>
               <a:ext uri="{FF2B5EF4-FFF2-40B4-BE49-F238E27FC236}">
-                <a16:creationId xmlns:a16="http://schemas.microsoft.com/office/drawing/2014/main" id="{79D1F581-1956-6B46-B0CF-EF324F87043E}"/>
+                <a16:creationId xmlns:a16="http://schemas.microsoft.com/office/drawing/2014/main" xmlns="" id="{79D1F581-1956-6B46-B0CF-EF324F87043E}"/>
               </a:ext>
             </a:extLst>
           </p:cNvPr>
@@ -5823,7 +5527,7 @@
           <p:cNvPr id="8" name="Picture 7">
             <a:extLst>
               <a:ext uri="{FF2B5EF4-FFF2-40B4-BE49-F238E27FC236}">
-                <a16:creationId xmlns:a16="http://schemas.microsoft.com/office/drawing/2014/main" id="{8737E7E6-CEB8-184C-8262-536663D2D199}"/>
+                <a16:creationId xmlns:a16="http://schemas.microsoft.com/office/drawing/2014/main" xmlns="" id="{8737E7E6-CEB8-184C-8262-536663D2D199}"/>
               </a:ext>
             </a:extLst>
           </p:cNvPr>
@@ -6022,7 +5726,7 @@
           <p:cNvPr id="2" name="Title 1">
             <a:extLst>
               <a:ext uri="{FF2B5EF4-FFF2-40B4-BE49-F238E27FC236}">
-                <a16:creationId xmlns:a16="http://schemas.microsoft.com/office/drawing/2014/main" id="{B0E07672-26A2-E241-ACBE-ACD935DB3AE4}"/>
+                <a16:creationId xmlns:a16="http://schemas.microsoft.com/office/drawing/2014/main" xmlns="" id="{B0E07672-26A2-E241-ACBE-ACD935DB3AE4}"/>
               </a:ext>
             </a:extLst>
           </p:cNvPr>
@@ -6076,7 +5780,7 @@
           <p:cNvPr id="6" name="TextBox 5">
             <a:extLst>
               <a:ext uri="{FF2B5EF4-FFF2-40B4-BE49-F238E27FC236}">
-                <a16:creationId xmlns:a16="http://schemas.microsoft.com/office/drawing/2014/main" id="{F328DB98-6E21-5142-A97F-A94627DABC80}"/>
+                <a16:creationId xmlns:a16="http://schemas.microsoft.com/office/drawing/2014/main" xmlns="" id="{F328DB98-6E21-5142-A97F-A94627DABC80}"/>
               </a:ext>
             </a:extLst>
           </p:cNvPr>
@@ -6111,7 +5815,7 @@
           <p:cNvPr id="5" name="Picture 4">
             <a:extLst>
               <a:ext uri="{FF2B5EF4-FFF2-40B4-BE49-F238E27FC236}">
-                <a16:creationId xmlns:a16="http://schemas.microsoft.com/office/drawing/2014/main" id="{05BFFCA1-2A1F-9B41-8855-65291725F150}"/>
+                <a16:creationId xmlns:a16="http://schemas.microsoft.com/office/drawing/2014/main" xmlns="" id="{05BFFCA1-2A1F-9B41-8855-65291725F150}"/>
               </a:ext>
             </a:extLst>
           </p:cNvPr>
@@ -6257,7 +5961,7 @@
           <p:cNvPr id="2" name="Title 1">
             <a:extLst>
               <a:ext uri="{FF2B5EF4-FFF2-40B4-BE49-F238E27FC236}">
-                <a16:creationId xmlns:a16="http://schemas.microsoft.com/office/drawing/2014/main" id="{B0E07672-26A2-E241-ACBE-ACD935DB3AE4}"/>
+                <a16:creationId xmlns:a16="http://schemas.microsoft.com/office/drawing/2014/main" xmlns="" id="{B0E07672-26A2-E241-ACBE-ACD935DB3AE4}"/>
               </a:ext>
             </a:extLst>
           </p:cNvPr>
@@ -6311,7 +6015,7 @@
           <p:cNvPr id="6" name="TextBox 5">
             <a:extLst>
               <a:ext uri="{FF2B5EF4-FFF2-40B4-BE49-F238E27FC236}">
-                <a16:creationId xmlns:a16="http://schemas.microsoft.com/office/drawing/2014/main" id="{F328DB98-6E21-5142-A97F-A94627DABC80}"/>
+                <a16:creationId xmlns:a16="http://schemas.microsoft.com/office/drawing/2014/main" xmlns="" id="{F328DB98-6E21-5142-A97F-A94627DABC80}"/>
               </a:ext>
             </a:extLst>
           </p:cNvPr>
@@ -6346,7 +6050,7 @@
           <p:cNvPr id="5" name="Picture 4">
             <a:extLst>
               <a:ext uri="{FF2B5EF4-FFF2-40B4-BE49-F238E27FC236}">
-                <a16:creationId xmlns:a16="http://schemas.microsoft.com/office/drawing/2014/main" id="{F6773395-DB16-EA4D-92F6-764CDC64BB5D}"/>
+                <a16:creationId xmlns:a16="http://schemas.microsoft.com/office/drawing/2014/main" xmlns="" id="{F6773395-DB16-EA4D-92F6-764CDC64BB5D}"/>
               </a:ext>
             </a:extLst>
           </p:cNvPr>
@@ -6492,7 +6196,7 @@
           <p:cNvPr id="2" name="Title 1">
             <a:extLst>
               <a:ext uri="{FF2B5EF4-FFF2-40B4-BE49-F238E27FC236}">
-                <a16:creationId xmlns:a16="http://schemas.microsoft.com/office/drawing/2014/main" id="{B0E07672-26A2-E241-ACBE-ACD935DB3AE4}"/>
+                <a16:creationId xmlns:a16="http://schemas.microsoft.com/office/drawing/2014/main" xmlns="" id="{B0E07672-26A2-E241-ACBE-ACD935DB3AE4}"/>
               </a:ext>
             </a:extLst>
           </p:cNvPr>
@@ -6546,7 +6250,7 @@
           <p:cNvPr id="6" name="TextBox 5">
             <a:extLst>
               <a:ext uri="{FF2B5EF4-FFF2-40B4-BE49-F238E27FC236}">
-                <a16:creationId xmlns:a16="http://schemas.microsoft.com/office/drawing/2014/main" id="{F328DB98-6E21-5142-A97F-A94627DABC80}"/>
+                <a16:creationId xmlns:a16="http://schemas.microsoft.com/office/drawing/2014/main" xmlns="" id="{F328DB98-6E21-5142-A97F-A94627DABC80}"/>
               </a:ext>
             </a:extLst>
           </p:cNvPr>
@@ -6581,7 +6285,7 @@
           <p:cNvPr id="5" name="Picture 4">
             <a:extLst>
               <a:ext uri="{FF2B5EF4-FFF2-40B4-BE49-F238E27FC236}">
-                <a16:creationId xmlns:a16="http://schemas.microsoft.com/office/drawing/2014/main" id="{15FE5D64-822C-714A-9836-687774C8CC96}"/>
+                <a16:creationId xmlns:a16="http://schemas.microsoft.com/office/drawing/2014/main" xmlns="" id="{15FE5D64-822C-714A-9836-687774C8CC96}"/>
               </a:ext>
             </a:extLst>
           </p:cNvPr>
@@ -6735,10 +6439,10 @@
           <p:cNvPr id="7" name="Rectangle 6">
             <a:extLst>
               <a:ext uri="{FF2B5EF4-FFF2-40B4-BE49-F238E27FC236}">
-                <a16:creationId xmlns:a16="http://schemas.microsoft.com/office/drawing/2014/main" id="{23962611-DFD5-4092-AAFD-559E3DFCE2C9}"/>
+                <a16:creationId xmlns:a16="http://schemas.microsoft.com/office/drawing/2014/main" xmlns="" id="{23962611-DFD5-4092-AAFD-559E3DFCE2C9}"/>
               </a:ext>
               <a:ext uri="{C183D7F6-B498-43B3-948B-1728B52AA6E4}">
-                <adec:decorative xmlns:adec="http://schemas.microsoft.com/office/drawing/2017/decorative" val="1"/>
+                <adec:decorative xmlns:adec="http://schemas.microsoft.com/office/drawing/2017/decorative" xmlns="" val="1"/>
               </a:ext>
             </a:extLst>
           </p:cNvPr>
@@ -6746,11 +6450,7 @@
             <a:spLocks noGrp="1" noRot="1" noChangeAspect="1" noMove="1" noResize="1" noEditPoints="1" noAdjustHandles="1" noChangeArrowheads="1" noChangeShapeType="1" noTextEdit="1"/>
           </p:cNvSpPr>
           <p:nvPr>
-            <p:extLst>
-              <p:ext uri="{386F3935-93C4-4BCD-93E2-E3B085C9AB24}">
-                <p16:designElem xmlns:p16="http://schemas.microsoft.com/office/powerpoint/2015/main" val="1"/>
-              </p:ext>
-            </p:extLst>
+            <p:extLst/>
           </p:nvPr>
         </p:nvSpPr>
         <p:spPr>
@@ -6820,10 +6520,10 @@
           <p:cNvPr id="9" name="Picture 8">
             <a:extLst>
               <a:ext uri="{FF2B5EF4-FFF2-40B4-BE49-F238E27FC236}">
-                <a16:creationId xmlns:a16="http://schemas.microsoft.com/office/drawing/2014/main" id="{2270F1FA-0425-408F-9861-80BF5AFB276D}"/>
+                <a16:creationId xmlns:a16="http://schemas.microsoft.com/office/drawing/2014/main" xmlns="" id="{2270F1FA-0425-408F-9861-80BF5AFB276D}"/>
               </a:ext>
               <a:ext uri="{C183D7F6-B498-43B3-948B-1728B52AA6E4}">
-                <adec:decorative xmlns:adec="http://schemas.microsoft.com/office/drawing/2017/decorative" val="1"/>
+                <adec:decorative xmlns:adec="http://schemas.microsoft.com/office/drawing/2017/decorative" xmlns="" val="1"/>
               </a:ext>
             </a:extLst>
           </p:cNvPr>
@@ -6831,11 +6531,7 @@
             <a:picLocks noGrp="1" noRot="1" noChangeAspect="1" noMove="1" noResize="1" noEditPoints="1" noAdjustHandles="1" noChangeArrowheads="1" noChangeShapeType="1" noCrop="1"/>
           </p:cNvPicPr>
           <p:nvPr>
-            <p:extLst>
-              <p:ext uri="{386F3935-93C4-4BCD-93E2-E3B085C9AB24}">
-                <p16:designElem xmlns:p16="http://schemas.microsoft.com/office/powerpoint/2015/main" val="1"/>
-              </p:ext>
-            </p:extLst>
+            <p:extLst/>
           </p:nvPr>
         </p:nvPicPr>
         <p:blipFill>
@@ -6865,7 +6561,7 @@
           <p:cNvPr id="2" name="Title 1">
             <a:extLst>
               <a:ext uri="{FF2B5EF4-FFF2-40B4-BE49-F238E27FC236}">
-                <a16:creationId xmlns:a16="http://schemas.microsoft.com/office/drawing/2014/main" id="{E02347F4-0E3E-A340-BD8C-AC0365208953}"/>
+                <a16:creationId xmlns:a16="http://schemas.microsoft.com/office/drawing/2014/main" xmlns="" id="{E02347F4-0E3E-A340-BD8C-AC0365208953}"/>
               </a:ext>
             </a:extLst>
           </p:cNvPr>
@@ -6919,7 +6615,7 @@
 <file path=ppt/theme/theme1.xml><?xml version="1.0" encoding="utf-8"?>
 <a:theme xmlns:a="http://schemas.openxmlformats.org/drawingml/2006/main" name="Office Theme">
   <a:themeElements>
-    <a:clrScheme name="Office">
+    <a:clrScheme name="Office Theme">
       <a:dk1>
         <a:sysClr val="windowText" lastClr="000000"/>
       </a:dk1>
@@ -6933,22 +6629,22 @@
         <a:srgbClr val="E7E6E6"/>
       </a:lt2>
       <a:accent1>
-        <a:srgbClr val="4472C4"/>
+        <a:srgbClr val="1D9A78"/>
       </a:accent1>
       <a:accent2>
-        <a:srgbClr val="ED7D31"/>
+        <a:srgbClr val="8BC145"/>
       </a:accent2>
       <a:accent3>
-        <a:srgbClr val="A5A5A5"/>
+        <a:srgbClr val="36AFCE"/>
       </a:accent3>
       <a:accent4>
-        <a:srgbClr val="FFC000"/>
+        <a:srgbClr val="1D6FA9"/>
       </a:accent4>
       <a:accent5>
-        <a:srgbClr val="5B9BD5"/>
+        <a:srgbClr val="B74919"/>
       </a:accent5>
       <a:accent6>
-        <a:srgbClr val="70AD47"/>
+        <a:srgbClr val="F19D19"/>
       </a:accent6>
       <a:hlink>
         <a:srgbClr val="0563C1"/>
@@ -6957,14 +6653,14 @@
         <a:srgbClr val="954F72"/>
       </a:folHlink>
     </a:clrScheme>
-    <a:fontScheme name="Office">
+    <a:fontScheme name="Office Theme">
       <a:majorFont>
         <a:latin typeface="Calibri Light" panose="020F0302020204030204"/>
         <a:ea typeface=""/>
         <a:cs typeface=""/>
-        <a:font script="Jpan" typeface="游ゴシック Light"/>
+        <a:font script="Jpan" typeface="ＭＳ Ｐゴシック"/>
         <a:font script="Hang" typeface="맑은 고딕"/>
-        <a:font script="Hans" typeface="等线 Light"/>
+        <a:font script="Hans" typeface="宋体"/>
         <a:font script="Hant" typeface="新細明體"/>
         <a:font script="Arab" typeface="Times New Roman"/>
         <a:font script="Hebr" typeface="Times New Roman"/>
@@ -6992,31 +6688,14 @@
         <a:font script="Viet" typeface="Times New Roman"/>
         <a:font script="Uigh" typeface="Microsoft Uighur"/>
         <a:font script="Geor" typeface="Sylfaen"/>
-        <a:font script="Armn" typeface="Arial"/>
-        <a:font script="Bugi" typeface="Leelawadee UI"/>
-        <a:font script="Bopo" typeface="Microsoft JhengHei"/>
-        <a:font script="Java" typeface="Javanese Text"/>
-        <a:font script="Lisu" typeface="Segoe UI"/>
-        <a:font script="Mymr" typeface="Myanmar Text"/>
-        <a:font script="Nkoo" typeface="Ebrima"/>
-        <a:font script="Olck" typeface="Nirmala UI"/>
-        <a:font script="Osma" typeface="Ebrima"/>
-        <a:font script="Phag" typeface="Phagspa"/>
-        <a:font script="Syrn" typeface="Estrangelo Edessa"/>
-        <a:font script="Syrj" typeface="Estrangelo Edessa"/>
-        <a:font script="Syre" typeface="Estrangelo Edessa"/>
-        <a:font script="Sora" typeface="Nirmala UI"/>
-        <a:font script="Tale" typeface="Microsoft Tai Le"/>
-        <a:font script="Talu" typeface="Microsoft New Tai Lue"/>
-        <a:font script="Tfng" typeface="Ebrima"/>
       </a:majorFont>
       <a:minorFont>
         <a:latin typeface="Calibri" panose="020F0502020204030204"/>
         <a:ea typeface=""/>
         <a:cs typeface=""/>
-        <a:font script="Jpan" typeface="游ゴシック"/>
+        <a:font script="Jpan" typeface="ＭＳ Ｐゴシック"/>
         <a:font script="Hang" typeface="맑은 고딕"/>
-        <a:font script="Hans" typeface="等线"/>
+        <a:font script="Hans" typeface="宋体"/>
         <a:font script="Hant" typeface="新細明體"/>
         <a:font script="Arab" typeface="Arial"/>
         <a:font script="Hebr" typeface="Arial"/>
@@ -7044,26 +6723,9 @@
         <a:font script="Viet" typeface="Arial"/>
         <a:font script="Uigh" typeface="Microsoft Uighur"/>
         <a:font script="Geor" typeface="Sylfaen"/>
-        <a:font script="Armn" typeface="Arial"/>
-        <a:font script="Bugi" typeface="Leelawadee UI"/>
-        <a:font script="Bopo" typeface="Microsoft JhengHei"/>
-        <a:font script="Java" typeface="Javanese Text"/>
-        <a:font script="Lisu" typeface="Segoe UI"/>
-        <a:font script="Mymr" typeface="Myanmar Text"/>
-        <a:font script="Nkoo" typeface="Ebrima"/>
-        <a:font script="Olck" typeface="Nirmala UI"/>
-        <a:font script="Osma" typeface="Ebrima"/>
-        <a:font script="Phag" typeface="Phagspa"/>
-        <a:font script="Syrn" typeface="Estrangelo Edessa"/>
-        <a:font script="Syrj" typeface="Estrangelo Edessa"/>
-        <a:font script="Syre" typeface="Estrangelo Edessa"/>
-        <a:font script="Sora" typeface="Nirmala UI"/>
-        <a:font script="Tale" typeface="Microsoft Tai Le"/>
-        <a:font script="Talu" typeface="Microsoft New Tai Lue"/>
-        <a:font script="Tfng" typeface="Ebrima"/>
       </a:minorFont>
     </a:fontScheme>
-    <a:fmtScheme name="Office">
+    <a:fmtScheme name="Office Theme">
       <a:fillStyleLst>
         <a:solidFill>
           <a:schemeClr val="phClr"/>
@@ -7205,7 +6867,7 @@
   <a:extraClrSchemeLst/>
   <a:extLst>
     <a:ext uri="{05A4C25C-085E-4340-85A3-A5531E510DB2}">
-      <thm15:themeFamily xmlns:thm15="http://schemas.microsoft.com/office/thememl/2012/main" name="Office Theme" id="{62F939B6-93AF-4DB8-9C6B-D6C7DFDC589F}" vid="{4A3C46E8-61CC-4603-A589-7422A47A8E4A}"/>
+      <thm15:themeFamily xmlns:thm15="http://schemas.microsoft.com/office/thememl/2012/main" name="Office Theme" id="{62F939B6-93AF-4DB8-9C6B-D6C7DFDC589F}" vid="{AE6F2518-B084-4896-AF52-66CC2144AA26}"/>
     </a:ext>
   </a:extLst>
 </a:theme>

</xml_diff>